<commit_message>
Part of the write up that is concerned with features and design
</commit_message>
<xml_diff>
--- a/graphics.pptx
+++ b/graphics.pptx
@@ -4,10 +4,19 @@
   <p:sldMasterIdLst>
     <p:sldMasterId id="2147483648" r:id="rId1"/>
   </p:sldMasterIdLst>
+  <p:notesMasterIdLst>
+    <p:notesMasterId r:id="rId11"/>
+  </p:notesMasterIdLst>
   <p:sldIdLst>
     <p:sldId id="256" r:id="rId2"/>
     <p:sldId id="257" r:id="rId3"/>
     <p:sldId id="258" r:id="rId4"/>
+    <p:sldId id="259" r:id="rId5"/>
+    <p:sldId id="260" r:id="rId6"/>
+    <p:sldId id="261" r:id="rId7"/>
+    <p:sldId id="262" r:id="rId8"/>
+    <p:sldId id="263" r:id="rId9"/>
+    <p:sldId id="264" r:id="rId10"/>
   </p:sldIdLst>
   <p:sldSz cx="9144000" cy="6858000" type="screen4x3"/>
   <p:notesSz cx="6858000" cy="9144000"/>
@@ -109,6 +118,440 @@
 </p:presentation>
 </file>
 
+<file path=ppt/notesMasters/notesMaster1.xml><?xml version="1.0" encoding="utf-8"?>
+<p:notesMaster xmlns:a="http://schemas.openxmlformats.org/drawingml/2006/main" xmlns:r="http://schemas.openxmlformats.org/officeDocument/2006/relationships" xmlns:p="http://schemas.openxmlformats.org/presentationml/2006/main">
+  <p:cSld>
+    <p:bg>
+      <p:bgRef idx="1001">
+        <a:schemeClr val="bg1"/>
+      </p:bgRef>
+    </p:bg>
+    <p:spTree>
+      <p:nvGrpSpPr>
+        <p:cNvPr id="1" name=""/>
+        <p:cNvGrpSpPr/>
+        <p:nvPr/>
+      </p:nvGrpSpPr>
+      <p:grpSpPr>
+        <a:xfrm>
+          <a:off x="0" y="0"/>
+          <a:ext cx="0" cy="0"/>
+          <a:chOff x="0" y="0"/>
+          <a:chExt cx="0" cy="0"/>
+        </a:xfrm>
+      </p:grpSpPr>
+      <p:sp>
+        <p:nvSpPr>
+          <p:cNvPr id="2" name="Header Placeholder 1"/>
+          <p:cNvSpPr>
+            <a:spLocks noGrp="1"/>
+          </p:cNvSpPr>
+          <p:nvPr>
+            <p:ph type="hdr" sz="quarter"/>
+          </p:nvPr>
+        </p:nvSpPr>
+        <p:spPr>
+          <a:xfrm>
+            <a:off x="0" y="0"/>
+            <a:ext cx="2971800" cy="457200"/>
+          </a:xfrm>
+          <a:prstGeom prst="rect">
+            <a:avLst/>
+          </a:prstGeom>
+        </p:spPr>
+        <p:txBody>
+          <a:bodyPr vert="horz" lIns="91440" tIns="45720" rIns="91440" bIns="45720" rtlCol="0"/>
+          <a:lstStyle>
+            <a:lvl1pPr algn="l">
+              <a:defRPr sz="1200"/>
+            </a:lvl1pPr>
+          </a:lstStyle>
+          <a:p>
+            <a:endParaRPr lang="en-US"/>
+          </a:p>
+        </p:txBody>
+      </p:sp>
+      <p:sp>
+        <p:nvSpPr>
+          <p:cNvPr id="3" name="Date Placeholder 2"/>
+          <p:cNvSpPr>
+            <a:spLocks noGrp="1"/>
+          </p:cNvSpPr>
+          <p:nvPr>
+            <p:ph type="dt" idx="1"/>
+          </p:nvPr>
+        </p:nvSpPr>
+        <p:spPr>
+          <a:xfrm>
+            <a:off x="3884613" y="0"/>
+            <a:ext cx="2971800" cy="457200"/>
+          </a:xfrm>
+          <a:prstGeom prst="rect">
+            <a:avLst/>
+          </a:prstGeom>
+        </p:spPr>
+        <p:txBody>
+          <a:bodyPr vert="horz" lIns="91440" tIns="45720" rIns="91440" bIns="45720" rtlCol="0"/>
+          <a:lstStyle>
+            <a:lvl1pPr algn="r">
+              <a:defRPr sz="1200"/>
+            </a:lvl1pPr>
+          </a:lstStyle>
+          <a:p>
+            <a:fld id="{3E6E0D9F-5A7F-AF48-A6D1-0F812A1A32ED}" type="datetimeFigureOut">
+              <a:rPr lang="en-US" smtClean="0"/>
+              <a:t>12/30/13</a:t>
+            </a:fld>
+            <a:endParaRPr lang="en-US"/>
+          </a:p>
+        </p:txBody>
+      </p:sp>
+      <p:sp>
+        <p:nvSpPr>
+          <p:cNvPr id="4" name="Slide Image Placeholder 3"/>
+          <p:cNvSpPr>
+            <a:spLocks noGrp="1" noRot="1" noChangeAspect="1"/>
+          </p:cNvSpPr>
+          <p:nvPr>
+            <p:ph type="sldImg" idx="2"/>
+          </p:nvPr>
+        </p:nvSpPr>
+        <p:spPr>
+          <a:xfrm>
+            <a:off x="1143000" y="685800"/>
+            <a:ext cx="4572000" cy="3429000"/>
+          </a:xfrm>
+          <a:prstGeom prst="rect">
+            <a:avLst/>
+          </a:prstGeom>
+          <a:noFill/>
+          <a:ln w="12700">
+            <a:solidFill>
+              <a:prstClr val="black"/>
+            </a:solidFill>
+          </a:ln>
+        </p:spPr>
+        <p:txBody>
+          <a:bodyPr vert="horz" lIns="91440" tIns="45720" rIns="91440" bIns="45720" rtlCol="0" anchor="ctr"/>
+          <a:lstStyle/>
+          <a:p>
+            <a:endParaRPr lang="en-US"/>
+          </a:p>
+        </p:txBody>
+      </p:sp>
+      <p:sp>
+        <p:nvSpPr>
+          <p:cNvPr id="5" name="Notes Placeholder 4"/>
+          <p:cNvSpPr>
+            <a:spLocks noGrp="1"/>
+          </p:cNvSpPr>
+          <p:nvPr>
+            <p:ph type="body" sz="quarter" idx="3"/>
+          </p:nvPr>
+        </p:nvSpPr>
+        <p:spPr>
+          <a:xfrm>
+            <a:off x="685800" y="4343400"/>
+            <a:ext cx="5486400" cy="4114800"/>
+          </a:xfrm>
+          <a:prstGeom prst="rect">
+            <a:avLst/>
+          </a:prstGeom>
+        </p:spPr>
+        <p:txBody>
+          <a:bodyPr vert="horz" lIns="91440" tIns="45720" rIns="91440" bIns="45720" rtlCol="0"/>
+          <a:lstStyle/>
+          <a:p>
+            <a:pPr lvl="0"/>
+            <a:r>
+              <a:rPr lang="en-US" smtClean="0"/>
+              <a:t>Click to edit Master text styles</a:t>
+            </a:r>
+          </a:p>
+          <a:p>
+            <a:pPr lvl="1"/>
+            <a:r>
+              <a:rPr lang="en-US" smtClean="0"/>
+              <a:t>Second level</a:t>
+            </a:r>
+          </a:p>
+          <a:p>
+            <a:pPr lvl="2"/>
+            <a:r>
+              <a:rPr lang="en-US" smtClean="0"/>
+              <a:t>Third level</a:t>
+            </a:r>
+          </a:p>
+          <a:p>
+            <a:pPr lvl="3"/>
+            <a:r>
+              <a:rPr lang="en-US" smtClean="0"/>
+              <a:t>Fourth level</a:t>
+            </a:r>
+          </a:p>
+          <a:p>
+            <a:pPr lvl="4"/>
+            <a:r>
+              <a:rPr lang="en-US" smtClean="0"/>
+              <a:t>Fifth level</a:t>
+            </a:r>
+            <a:endParaRPr lang="en-US"/>
+          </a:p>
+        </p:txBody>
+      </p:sp>
+      <p:sp>
+        <p:nvSpPr>
+          <p:cNvPr id="6" name="Footer Placeholder 5"/>
+          <p:cNvSpPr>
+            <a:spLocks noGrp="1"/>
+          </p:cNvSpPr>
+          <p:nvPr>
+            <p:ph type="ftr" sz="quarter" idx="4"/>
+          </p:nvPr>
+        </p:nvSpPr>
+        <p:spPr>
+          <a:xfrm>
+            <a:off x="0" y="8685213"/>
+            <a:ext cx="2971800" cy="457200"/>
+          </a:xfrm>
+          <a:prstGeom prst="rect">
+            <a:avLst/>
+          </a:prstGeom>
+        </p:spPr>
+        <p:txBody>
+          <a:bodyPr vert="horz" lIns="91440" tIns="45720" rIns="91440" bIns="45720" rtlCol="0" anchor="b"/>
+          <a:lstStyle>
+            <a:lvl1pPr algn="l">
+              <a:defRPr sz="1200"/>
+            </a:lvl1pPr>
+          </a:lstStyle>
+          <a:p>
+            <a:endParaRPr lang="en-US"/>
+          </a:p>
+        </p:txBody>
+      </p:sp>
+      <p:sp>
+        <p:nvSpPr>
+          <p:cNvPr id="7" name="Slide Number Placeholder 6"/>
+          <p:cNvSpPr>
+            <a:spLocks noGrp="1"/>
+          </p:cNvSpPr>
+          <p:nvPr>
+            <p:ph type="sldNum" sz="quarter" idx="5"/>
+          </p:nvPr>
+        </p:nvSpPr>
+        <p:spPr>
+          <a:xfrm>
+            <a:off x="3884613" y="8685213"/>
+            <a:ext cx="2971800" cy="457200"/>
+          </a:xfrm>
+          <a:prstGeom prst="rect">
+            <a:avLst/>
+          </a:prstGeom>
+        </p:spPr>
+        <p:txBody>
+          <a:bodyPr vert="horz" lIns="91440" tIns="45720" rIns="91440" bIns="45720" rtlCol="0" anchor="b"/>
+          <a:lstStyle>
+            <a:lvl1pPr algn="r">
+              <a:defRPr sz="1200"/>
+            </a:lvl1pPr>
+          </a:lstStyle>
+          <a:p>
+            <a:fld id="{6BE89F0A-DDF1-E442-AC9D-24B6972451DF}" type="slidenum">
+              <a:rPr lang="en-US" smtClean="0"/>
+              <a:t>‹#›</a:t>
+            </a:fld>
+            <a:endParaRPr lang="en-US"/>
+          </a:p>
+        </p:txBody>
+      </p:sp>
+    </p:spTree>
+    <p:extLst>
+      <p:ext uri="{BB962C8B-B14F-4D97-AF65-F5344CB8AC3E}">
+        <p14:creationId xmlns:p14="http://schemas.microsoft.com/office/powerpoint/2010/main" val="3126819856"/>
+      </p:ext>
+    </p:extLst>
+  </p:cSld>
+  <p:clrMap bg1="lt1" tx1="dk1" bg2="lt2" tx2="dk2" accent1="accent1" accent2="accent2" accent3="accent3" accent4="accent4" accent5="accent5" accent6="accent6" hlink="hlink" folHlink="folHlink"/>
+  <p:notesStyle>
+    <a:lvl1pPr marL="0" algn="l" defTabSz="457200" rtl="0" eaLnBrk="1" latinLnBrk="0" hangingPunct="1">
+      <a:defRPr sz="1200" kern="1200">
+        <a:solidFill>
+          <a:schemeClr val="tx1"/>
+        </a:solidFill>
+        <a:latin typeface="+mn-lt"/>
+        <a:ea typeface="+mn-ea"/>
+        <a:cs typeface="+mn-cs"/>
+      </a:defRPr>
+    </a:lvl1pPr>
+    <a:lvl2pPr marL="457200" algn="l" defTabSz="457200" rtl="0" eaLnBrk="1" latinLnBrk="0" hangingPunct="1">
+      <a:defRPr sz="1200" kern="1200">
+        <a:solidFill>
+          <a:schemeClr val="tx1"/>
+        </a:solidFill>
+        <a:latin typeface="+mn-lt"/>
+        <a:ea typeface="+mn-ea"/>
+        <a:cs typeface="+mn-cs"/>
+      </a:defRPr>
+    </a:lvl2pPr>
+    <a:lvl3pPr marL="914400" algn="l" defTabSz="457200" rtl="0" eaLnBrk="1" latinLnBrk="0" hangingPunct="1">
+      <a:defRPr sz="1200" kern="1200">
+        <a:solidFill>
+          <a:schemeClr val="tx1"/>
+        </a:solidFill>
+        <a:latin typeface="+mn-lt"/>
+        <a:ea typeface="+mn-ea"/>
+        <a:cs typeface="+mn-cs"/>
+      </a:defRPr>
+    </a:lvl3pPr>
+    <a:lvl4pPr marL="1371600" algn="l" defTabSz="457200" rtl="0" eaLnBrk="1" latinLnBrk="0" hangingPunct="1">
+      <a:defRPr sz="1200" kern="1200">
+        <a:solidFill>
+          <a:schemeClr val="tx1"/>
+        </a:solidFill>
+        <a:latin typeface="+mn-lt"/>
+        <a:ea typeface="+mn-ea"/>
+        <a:cs typeface="+mn-cs"/>
+      </a:defRPr>
+    </a:lvl4pPr>
+    <a:lvl5pPr marL="1828800" algn="l" defTabSz="457200" rtl="0" eaLnBrk="1" latinLnBrk="0" hangingPunct="1">
+      <a:defRPr sz="1200" kern="1200">
+        <a:solidFill>
+          <a:schemeClr val="tx1"/>
+        </a:solidFill>
+        <a:latin typeface="+mn-lt"/>
+        <a:ea typeface="+mn-ea"/>
+        <a:cs typeface="+mn-cs"/>
+      </a:defRPr>
+    </a:lvl5pPr>
+    <a:lvl6pPr marL="2286000" algn="l" defTabSz="457200" rtl="0" eaLnBrk="1" latinLnBrk="0" hangingPunct="1">
+      <a:defRPr sz="1200" kern="1200">
+        <a:solidFill>
+          <a:schemeClr val="tx1"/>
+        </a:solidFill>
+        <a:latin typeface="+mn-lt"/>
+        <a:ea typeface="+mn-ea"/>
+        <a:cs typeface="+mn-cs"/>
+      </a:defRPr>
+    </a:lvl6pPr>
+    <a:lvl7pPr marL="2743200" algn="l" defTabSz="457200" rtl="0" eaLnBrk="1" latinLnBrk="0" hangingPunct="1">
+      <a:defRPr sz="1200" kern="1200">
+        <a:solidFill>
+          <a:schemeClr val="tx1"/>
+        </a:solidFill>
+        <a:latin typeface="+mn-lt"/>
+        <a:ea typeface="+mn-ea"/>
+        <a:cs typeface="+mn-cs"/>
+      </a:defRPr>
+    </a:lvl7pPr>
+    <a:lvl8pPr marL="3200400" algn="l" defTabSz="457200" rtl="0" eaLnBrk="1" latinLnBrk="0" hangingPunct="1">
+      <a:defRPr sz="1200" kern="1200">
+        <a:solidFill>
+          <a:schemeClr val="tx1"/>
+        </a:solidFill>
+        <a:latin typeface="+mn-lt"/>
+        <a:ea typeface="+mn-ea"/>
+        <a:cs typeface="+mn-cs"/>
+      </a:defRPr>
+    </a:lvl8pPr>
+    <a:lvl9pPr marL="3657600" algn="l" defTabSz="457200" rtl="0" eaLnBrk="1" latinLnBrk="0" hangingPunct="1">
+      <a:defRPr sz="1200" kern="1200">
+        <a:solidFill>
+          <a:schemeClr val="tx1"/>
+        </a:solidFill>
+        <a:latin typeface="+mn-lt"/>
+        <a:ea typeface="+mn-ea"/>
+        <a:cs typeface="+mn-cs"/>
+      </a:defRPr>
+    </a:lvl9pPr>
+  </p:notesStyle>
+</p:notesMaster>
+</file>
+
+<file path=ppt/notesSlides/notesSlide1.xml><?xml version="1.0" encoding="utf-8"?>
+<p:notes xmlns:a="http://schemas.openxmlformats.org/drawingml/2006/main" xmlns:r="http://schemas.openxmlformats.org/officeDocument/2006/relationships" xmlns:p="http://schemas.openxmlformats.org/presentationml/2006/main">
+  <p:cSld>
+    <p:spTree>
+      <p:nvGrpSpPr>
+        <p:cNvPr id="1" name=""/>
+        <p:cNvGrpSpPr/>
+        <p:nvPr/>
+      </p:nvGrpSpPr>
+      <p:grpSpPr>
+        <a:xfrm>
+          <a:off x="0" y="0"/>
+          <a:ext cx="0" cy="0"/>
+          <a:chOff x="0" y="0"/>
+          <a:chExt cx="0" cy="0"/>
+        </a:xfrm>
+      </p:grpSpPr>
+      <p:sp>
+        <p:nvSpPr>
+          <p:cNvPr id="2" name="Slide Image Placeholder 1"/>
+          <p:cNvSpPr>
+            <a:spLocks noGrp="1" noRot="1" noChangeAspect="1"/>
+          </p:cNvSpPr>
+          <p:nvPr>
+            <p:ph type="sldImg"/>
+          </p:nvPr>
+        </p:nvSpPr>
+        <p:spPr/>
+      </p:sp>
+      <p:sp>
+        <p:nvSpPr>
+          <p:cNvPr id="3" name="Notes Placeholder 2"/>
+          <p:cNvSpPr>
+            <a:spLocks noGrp="1"/>
+          </p:cNvSpPr>
+          <p:nvPr>
+            <p:ph type="body" idx="1"/>
+          </p:nvPr>
+        </p:nvSpPr>
+        <p:spPr/>
+        <p:txBody>
+          <a:bodyPr/>
+          <a:lstStyle/>
+          <a:p>
+            <a:endParaRPr lang="en-US" dirty="0"/>
+          </a:p>
+        </p:txBody>
+      </p:sp>
+      <p:sp>
+        <p:nvSpPr>
+          <p:cNvPr id="4" name="Slide Number Placeholder 3"/>
+          <p:cNvSpPr>
+            <a:spLocks noGrp="1"/>
+          </p:cNvSpPr>
+          <p:nvPr>
+            <p:ph type="sldNum" sz="quarter" idx="10"/>
+          </p:nvPr>
+        </p:nvSpPr>
+        <p:spPr/>
+        <p:txBody>
+          <a:bodyPr/>
+          <a:lstStyle/>
+          <a:p>
+            <a:fld id="{6BE89F0A-DDF1-E442-AC9D-24B6972451DF}" type="slidenum">
+              <a:rPr lang="en-US" smtClean="0"/>
+              <a:t>4</a:t>
+            </a:fld>
+            <a:endParaRPr lang="en-US"/>
+          </a:p>
+        </p:txBody>
+      </p:sp>
+    </p:spTree>
+    <p:extLst>
+      <p:ext uri="{BB962C8B-B14F-4D97-AF65-F5344CB8AC3E}">
+        <p14:creationId xmlns:p14="http://schemas.microsoft.com/office/powerpoint/2010/main" val="418770203"/>
+      </p:ext>
+    </p:extLst>
+  </p:cSld>
+  <p:clrMapOvr>
+    <a:masterClrMapping/>
+  </p:clrMapOvr>
+</p:notes>
+</file>
+
 <file path=ppt/slideLayouts/slideLayout1.xml><?xml version="1.0" encoding="utf-8"?>
 <p:sldLayout xmlns:a="http://schemas.openxmlformats.org/drawingml/2006/main" xmlns:r="http://schemas.openxmlformats.org/officeDocument/2006/relationships" xmlns:p="http://schemas.openxmlformats.org/presentationml/2006/main" type="title" preserve="1">
   <p:cSld name="Title Slide">
@@ -290,7 +733,7 @@
           <a:p>
             <a:fld id="{E9D49A29-2F19-304D-98E4-834B4A36006B}" type="datetimeFigureOut">
               <a:rPr lang="en-US" smtClean="0"/>
-              <a:t>12/29/13</a:t>
+              <a:t>12/30/13</a:t>
             </a:fld>
             <a:endParaRPr lang="en-US"/>
           </a:p>
@@ -460,7 +903,7 @@
           <a:p>
             <a:fld id="{E9D49A29-2F19-304D-98E4-834B4A36006B}" type="datetimeFigureOut">
               <a:rPr lang="en-US" smtClean="0"/>
-              <a:t>12/29/13</a:t>
+              <a:t>12/30/13</a:t>
             </a:fld>
             <a:endParaRPr lang="en-US"/>
           </a:p>
@@ -640,7 +1083,7 @@
           <a:p>
             <a:fld id="{E9D49A29-2F19-304D-98E4-834B4A36006B}" type="datetimeFigureOut">
               <a:rPr lang="en-US" smtClean="0"/>
-              <a:t>12/29/13</a:t>
+              <a:t>12/30/13</a:t>
             </a:fld>
             <a:endParaRPr lang="en-US"/>
           </a:p>
@@ -810,7 +1253,7 @@
           <a:p>
             <a:fld id="{E9D49A29-2F19-304D-98E4-834B4A36006B}" type="datetimeFigureOut">
               <a:rPr lang="en-US" smtClean="0"/>
-              <a:t>12/29/13</a:t>
+              <a:t>12/30/13</a:t>
             </a:fld>
             <a:endParaRPr lang="en-US"/>
           </a:p>
@@ -1056,7 +1499,7 @@
           <a:p>
             <a:fld id="{E9D49A29-2F19-304D-98E4-834B4A36006B}" type="datetimeFigureOut">
               <a:rPr lang="en-US" smtClean="0"/>
-              <a:t>12/29/13</a:t>
+              <a:t>12/30/13</a:t>
             </a:fld>
             <a:endParaRPr lang="en-US"/>
           </a:p>
@@ -1344,7 +1787,7 @@
           <a:p>
             <a:fld id="{E9D49A29-2F19-304D-98E4-834B4A36006B}" type="datetimeFigureOut">
               <a:rPr lang="en-US" smtClean="0"/>
-              <a:t>12/29/13</a:t>
+              <a:t>12/30/13</a:t>
             </a:fld>
             <a:endParaRPr lang="en-US"/>
           </a:p>
@@ -1766,7 +2209,7 @@
           <a:p>
             <a:fld id="{E9D49A29-2F19-304D-98E4-834B4A36006B}" type="datetimeFigureOut">
               <a:rPr lang="en-US" smtClean="0"/>
-              <a:t>12/29/13</a:t>
+              <a:t>12/30/13</a:t>
             </a:fld>
             <a:endParaRPr lang="en-US"/>
           </a:p>
@@ -1884,7 +2327,7 @@
           <a:p>
             <a:fld id="{E9D49A29-2F19-304D-98E4-834B4A36006B}" type="datetimeFigureOut">
               <a:rPr lang="en-US" smtClean="0"/>
-              <a:t>12/29/13</a:t>
+              <a:t>12/30/13</a:t>
             </a:fld>
             <a:endParaRPr lang="en-US"/>
           </a:p>
@@ -1979,7 +2422,7 @@
           <a:p>
             <a:fld id="{E9D49A29-2F19-304D-98E4-834B4A36006B}" type="datetimeFigureOut">
               <a:rPr lang="en-US" smtClean="0"/>
-              <a:t>12/29/13</a:t>
+              <a:t>12/30/13</a:t>
             </a:fld>
             <a:endParaRPr lang="en-US"/>
           </a:p>
@@ -2256,7 +2699,7 @@
           <a:p>
             <a:fld id="{E9D49A29-2F19-304D-98E4-834B4A36006B}" type="datetimeFigureOut">
               <a:rPr lang="en-US" smtClean="0"/>
-              <a:t>12/29/13</a:t>
+              <a:t>12/30/13</a:t>
             </a:fld>
             <a:endParaRPr lang="en-US"/>
           </a:p>
@@ -2509,7 +2952,7 @@
           <a:p>
             <a:fld id="{E9D49A29-2F19-304D-98E4-834B4A36006B}" type="datetimeFigureOut">
               <a:rPr lang="en-US" smtClean="0"/>
-              <a:t>12/29/13</a:t>
+              <a:t>12/30/13</a:t>
             </a:fld>
             <a:endParaRPr lang="en-US"/>
           </a:p>
@@ -2722,7 +3165,7 @@
           <a:p>
             <a:fld id="{E9D49A29-2F19-304D-98E4-834B4A36006B}" type="datetimeFigureOut">
               <a:rPr lang="en-US" smtClean="0"/>
-              <a:t>12/29/13</a:t>
+              <a:t>12/30/13</a:t>
             </a:fld>
             <a:endParaRPr lang="en-US"/>
           </a:p>
@@ -3808,6 +4251,2014 @@
     <p:extLst>
       <p:ext uri="{BB962C8B-B14F-4D97-AF65-F5344CB8AC3E}">
         <p14:creationId xmlns:p14="http://schemas.microsoft.com/office/powerpoint/2010/main" val="1179037751"/>
+      </p:ext>
+    </p:extLst>
+  </p:cSld>
+  <p:clrMapOvr>
+    <a:masterClrMapping/>
+  </p:clrMapOvr>
+</p:sld>
+</file>
+
+<file path=ppt/slides/slide4.xml><?xml version="1.0" encoding="utf-8"?>
+<p:sld xmlns:a="http://schemas.openxmlformats.org/drawingml/2006/main" xmlns:r="http://schemas.openxmlformats.org/officeDocument/2006/relationships" xmlns:p="http://schemas.openxmlformats.org/presentationml/2006/main">
+  <p:cSld>
+    <p:spTree>
+      <p:nvGrpSpPr>
+        <p:cNvPr id="1" name=""/>
+        <p:cNvGrpSpPr/>
+        <p:nvPr/>
+      </p:nvGrpSpPr>
+      <p:grpSpPr>
+        <a:xfrm>
+          <a:off x="0" y="0"/>
+          <a:ext cx="0" cy="0"/>
+          <a:chOff x="0" y="0"/>
+          <a:chExt cx="0" cy="0"/>
+        </a:xfrm>
+      </p:grpSpPr>
+      <p:pic>
+        <p:nvPicPr>
+          <p:cNvPr id="4" name="Picture 3"/>
+          <p:cNvPicPr>
+            <a:picLocks noChangeAspect="1"/>
+          </p:cNvPicPr>
+          <p:nvPr/>
+        </p:nvPicPr>
+        <p:blipFill>
+          <a:blip r:embed="rId3"/>
+          <a:stretch>
+            <a:fillRect/>
+          </a:stretch>
+        </p:blipFill>
+        <p:spPr>
+          <a:xfrm>
+            <a:off x="0" y="1439341"/>
+            <a:ext cx="9144000" cy="3091912"/>
+          </a:xfrm>
+          <a:prstGeom prst="rect">
+            <a:avLst/>
+          </a:prstGeom>
+        </p:spPr>
+      </p:pic>
+      <p:sp>
+        <p:nvSpPr>
+          <p:cNvPr id="5" name="Title 4"/>
+          <p:cNvSpPr>
+            <a:spLocks noGrp="1"/>
+          </p:cNvSpPr>
+          <p:nvPr>
+            <p:ph type="title"/>
+          </p:nvPr>
+        </p:nvSpPr>
+        <p:spPr/>
+        <p:txBody>
+          <a:bodyPr/>
+          <a:lstStyle/>
+          <a:p>
+            <a:r>
+              <a:rPr lang="en-US" dirty="0" smtClean="0"/>
+              <a:t>The TA View</a:t>
+            </a:r>
+            <a:endParaRPr lang="en-US" dirty="0"/>
+          </a:p>
+        </p:txBody>
+      </p:sp>
+      <p:cxnSp>
+        <p:nvCxnSpPr>
+          <p:cNvPr id="8" name="Straight Arrow Connector 7"/>
+          <p:cNvCxnSpPr/>
+          <p:nvPr/>
+        </p:nvCxnSpPr>
+        <p:spPr>
+          <a:xfrm>
+            <a:off x="8388687" y="1856249"/>
+            <a:ext cx="247700" cy="1018843"/>
+          </a:xfrm>
+          <a:prstGeom prst="straightConnector1">
+            <a:avLst/>
+          </a:prstGeom>
+          <a:ln>
+            <a:tailEnd type="arrow"/>
+          </a:ln>
+        </p:spPr>
+        <p:style>
+          <a:lnRef idx="2">
+            <a:schemeClr val="accent1"/>
+          </a:lnRef>
+          <a:fillRef idx="0">
+            <a:schemeClr val="accent1"/>
+          </a:fillRef>
+          <a:effectRef idx="1">
+            <a:schemeClr val="accent1"/>
+          </a:effectRef>
+          <a:fontRef idx="minor">
+            <a:schemeClr val="tx1"/>
+          </a:fontRef>
+        </p:style>
+      </p:cxnSp>
+      <p:cxnSp>
+        <p:nvCxnSpPr>
+          <p:cNvPr id="15" name="Straight Arrow Connector 14"/>
+          <p:cNvCxnSpPr/>
+          <p:nvPr/>
+        </p:nvCxnSpPr>
+        <p:spPr>
+          <a:xfrm flipH="1">
+            <a:off x="8233438" y="1856249"/>
+            <a:ext cx="155249" cy="1018843"/>
+          </a:xfrm>
+          <a:prstGeom prst="straightConnector1">
+            <a:avLst/>
+          </a:prstGeom>
+          <a:ln>
+            <a:tailEnd type="arrow"/>
+          </a:ln>
+        </p:spPr>
+        <p:style>
+          <a:lnRef idx="2">
+            <a:schemeClr val="accent1"/>
+          </a:lnRef>
+          <a:fillRef idx="0">
+            <a:schemeClr val="accent1"/>
+          </a:fillRef>
+          <a:effectRef idx="1">
+            <a:schemeClr val="accent1"/>
+          </a:effectRef>
+          <a:fontRef idx="minor">
+            <a:schemeClr val="tx1"/>
+          </a:fontRef>
+        </p:style>
+      </p:cxnSp>
+      <p:sp>
+        <p:nvSpPr>
+          <p:cNvPr id="16" name="Rounded Rectangle 15"/>
+          <p:cNvSpPr/>
+          <p:nvPr/>
+        </p:nvSpPr>
+        <p:spPr>
+          <a:xfrm>
+            <a:off x="7619419" y="1515337"/>
+            <a:ext cx="1521093" cy="299043"/>
+          </a:xfrm>
+          <a:prstGeom prst="roundRect">
+            <a:avLst/>
+          </a:prstGeom>
+        </p:spPr>
+        <p:style>
+          <a:lnRef idx="1">
+            <a:schemeClr val="accent1"/>
+          </a:lnRef>
+          <a:fillRef idx="3">
+            <a:schemeClr val="accent1"/>
+          </a:fillRef>
+          <a:effectRef idx="2">
+            <a:schemeClr val="accent1"/>
+          </a:effectRef>
+          <a:fontRef idx="minor">
+            <a:schemeClr val="lt1"/>
+          </a:fontRef>
+        </p:style>
+        <p:txBody>
+          <a:bodyPr rtlCol="0" anchor="ctr"/>
+          <a:lstStyle/>
+          <a:p>
+            <a:pPr algn="ctr"/>
+            <a:r>
+              <a:rPr lang="en-US" dirty="0" smtClean="0"/>
+              <a:t>Close/Cancel</a:t>
+            </a:r>
+            <a:endParaRPr lang="en-US" dirty="0"/>
+          </a:p>
+        </p:txBody>
+      </p:sp>
+      <p:sp>
+        <p:nvSpPr>
+          <p:cNvPr id="17" name="Left Brace 16"/>
+          <p:cNvSpPr/>
+          <p:nvPr/>
+        </p:nvSpPr>
+        <p:spPr>
+          <a:xfrm rot="16200000">
+            <a:off x="4616683" y="1910017"/>
+            <a:ext cx="367572" cy="5275075"/>
+          </a:xfrm>
+          <a:prstGeom prst="leftBrace">
+            <a:avLst/>
+          </a:prstGeom>
+        </p:spPr>
+        <p:style>
+          <a:lnRef idx="2">
+            <a:schemeClr val="accent1"/>
+          </a:lnRef>
+          <a:fillRef idx="0">
+            <a:schemeClr val="accent1"/>
+          </a:fillRef>
+          <a:effectRef idx="1">
+            <a:schemeClr val="accent1"/>
+          </a:effectRef>
+          <a:fontRef idx="minor">
+            <a:schemeClr val="tx1"/>
+          </a:fontRef>
+        </p:style>
+        <p:txBody>
+          <a:bodyPr rtlCol="0" anchor="ctr"/>
+          <a:lstStyle/>
+          <a:p>
+            <a:pPr algn="ctr"/>
+            <a:endParaRPr lang="en-US"/>
+          </a:p>
+        </p:txBody>
+      </p:sp>
+      <p:cxnSp>
+        <p:nvCxnSpPr>
+          <p:cNvPr id="19" name="Straight Arrow Connector 18"/>
+          <p:cNvCxnSpPr/>
+          <p:nvPr/>
+        </p:nvCxnSpPr>
+        <p:spPr>
+          <a:xfrm flipH="1">
+            <a:off x="5224487" y="1856249"/>
+            <a:ext cx="461616" cy="467552"/>
+          </a:xfrm>
+          <a:prstGeom prst="straightConnector1">
+            <a:avLst/>
+          </a:prstGeom>
+          <a:ln>
+            <a:tailEnd type="arrow"/>
+          </a:ln>
+        </p:spPr>
+        <p:style>
+          <a:lnRef idx="2">
+            <a:schemeClr val="accent1"/>
+          </a:lnRef>
+          <a:fillRef idx="0">
+            <a:schemeClr val="accent1"/>
+          </a:fillRef>
+          <a:effectRef idx="1">
+            <a:schemeClr val="accent1"/>
+          </a:effectRef>
+          <a:fontRef idx="minor">
+            <a:schemeClr val="tx1"/>
+          </a:fontRef>
+        </p:style>
+      </p:cxnSp>
+      <p:sp>
+        <p:nvSpPr>
+          <p:cNvPr id="23" name="Rounded Rectangle 22"/>
+          <p:cNvSpPr/>
+          <p:nvPr/>
+        </p:nvSpPr>
+        <p:spPr>
+          <a:xfrm>
+            <a:off x="4861657" y="1491427"/>
+            <a:ext cx="1697183" cy="299043"/>
+          </a:xfrm>
+          <a:prstGeom prst="roundRect">
+            <a:avLst/>
+          </a:prstGeom>
+        </p:spPr>
+        <p:style>
+          <a:lnRef idx="1">
+            <a:schemeClr val="accent1"/>
+          </a:lnRef>
+          <a:fillRef idx="3">
+            <a:schemeClr val="accent1"/>
+          </a:fillRef>
+          <a:effectRef idx="2">
+            <a:schemeClr val="accent1"/>
+          </a:effectRef>
+          <a:fontRef idx="minor">
+            <a:schemeClr val="lt1"/>
+          </a:fontRef>
+        </p:style>
+        <p:txBody>
+          <a:bodyPr rtlCol="0" anchor="ctr"/>
+          <a:lstStyle/>
+          <a:p>
+            <a:pPr algn="ctr"/>
+            <a:r>
+              <a:rPr lang="en-US" dirty="0" smtClean="0"/>
+              <a:t>Wait Estimate</a:t>
+            </a:r>
+            <a:endParaRPr lang="en-US" dirty="0"/>
+          </a:p>
+        </p:txBody>
+      </p:sp>
+      <p:sp>
+        <p:nvSpPr>
+          <p:cNvPr id="24" name="Rounded Rectangle 23"/>
+          <p:cNvSpPr/>
+          <p:nvPr/>
+        </p:nvSpPr>
+        <p:spPr>
+          <a:xfrm>
+            <a:off x="2837081" y="4825034"/>
+            <a:ext cx="3931081" cy="299043"/>
+          </a:xfrm>
+          <a:prstGeom prst="roundRect">
+            <a:avLst/>
+          </a:prstGeom>
+        </p:spPr>
+        <p:style>
+          <a:lnRef idx="1">
+            <a:schemeClr val="accent1"/>
+          </a:lnRef>
+          <a:fillRef idx="3">
+            <a:schemeClr val="accent1"/>
+          </a:fillRef>
+          <a:effectRef idx="2">
+            <a:schemeClr val="accent1"/>
+          </a:effectRef>
+          <a:fontRef idx="minor">
+            <a:schemeClr val="lt1"/>
+          </a:fontRef>
+        </p:style>
+        <p:txBody>
+          <a:bodyPr rtlCol="0" anchor="ctr"/>
+          <a:lstStyle/>
+          <a:p>
+            <a:pPr algn="ctr"/>
+            <a:r>
+              <a:rPr lang="en-US" dirty="0" smtClean="0"/>
+              <a:t>Information on Students in the Queue</a:t>
+            </a:r>
+            <a:endParaRPr lang="en-US" dirty="0"/>
+          </a:p>
+        </p:txBody>
+      </p:sp>
+      <p:cxnSp>
+        <p:nvCxnSpPr>
+          <p:cNvPr id="26" name="Straight Arrow Connector 25"/>
+          <p:cNvCxnSpPr/>
+          <p:nvPr/>
+        </p:nvCxnSpPr>
+        <p:spPr>
+          <a:xfrm flipH="1" flipV="1">
+            <a:off x="641929" y="2470346"/>
+            <a:ext cx="153505" cy="781578"/>
+          </a:xfrm>
+          <a:prstGeom prst="straightConnector1">
+            <a:avLst/>
+          </a:prstGeom>
+          <a:ln>
+            <a:tailEnd type="arrow"/>
+          </a:ln>
+        </p:spPr>
+        <p:style>
+          <a:lnRef idx="2">
+            <a:schemeClr val="accent1"/>
+          </a:lnRef>
+          <a:fillRef idx="0">
+            <a:schemeClr val="accent1"/>
+          </a:fillRef>
+          <a:effectRef idx="1">
+            <a:schemeClr val="accent1"/>
+          </a:effectRef>
+          <a:fontRef idx="minor">
+            <a:schemeClr val="tx1"/>
+          </a:fontRef>
+        </p:style>
+      </p:cxnSp>
+      <p:sp>
+        <p:nvSpPr>
+          <p:cNvPr id="33" name="Rounded Rectangle 32"/>
+          <p:cNvSpPr/>
+          <p:nvPr/>
+        </p:nvSpPr>
+        <p:spPr>
+          <a:xfrm>
+            <a:off x="44528" y="3326645"/>
+            <a:ext cx="1532386" cy="299043"/>
+          </a:xfrm>
+          <a:prstGeom prst="roundRect">
+            <a:avLst/>
+          </a:prstGeom>
+        </p:spPr>
+        <p:style>
+          <a:lnRef idx="1">
+            <a:schemeClr val="accent1"/>
+          </a:lnRef>
+          <a:fillRef idx="3">
+            <a:schemeClr val="accent1"/>
+          </a:fillRef>
+          <a:effectRef idx="2">
+            <a:schemeClr val="accent1"/>
+          </a:effectRef>
+          <a:fontRef idx="minor">
+            <a:schemeClr val="lt1"/>
+          </a:fontRef>
+        </p:style>
+        <p:txBody>
+          <a:bodyPr rtlCol="0" anchor="ctr"/>
+          <a:lstStyle/>
+          <a:p>
+            <a:pPr algn="ctr"/>
+            <a:r>
+              <a:rPr lang="en-US" dirty="0" smtClean="0"/>
+              <a:t>Login Status</a:t>
+            </a:r>
+            <a:endParaRPr lang="en-US" dirty="0"/>
+          </a:p>
+        </p:txBody>
+      </p:sp>
+    </p:spTree>
+    <p:extLst>
+      <p:ext uri="{BB962C8B-B14F-4D97-AF65-F5344CB8AC3E}">
+        <p14:creationId xmlns:p14="http://schemas.microsoft.com/office/powerpoint/2010/main" val="3563764600"/>
+      </p:ext>
+    </p:extLst>
+  </p:cSld>
+  <p:clrMapOvr>
+    <a:masterClrMapping/>
+  </p:clrMapOvr>
+</p:sld>
+</file>
+
+<file path=ppt/slides/slide5.xml><?xml version="1.0" encoding="utf-8"?>
+<p:sld xmlns:a="http://schemas.openxmlformats.org/drawingml/2006/main" xmlns:r="http://schemas.openxmlformats.org/officeDocument/2006/relationships" xmlns:p="http://schemas.openxmlformats.org/presentationml/2006/main">
+  <p:cSld>
+    <p:spTree>
+      <p:nvGrpSpPr>
+        <p:cNvPr id="1" name=""/>
+        <p:cNvGrpSpPr/>
+        <p:nvPr/>
+      </p:nvGrpSpPr>
+      <p:grpSpPr>
+        <a:xfrm>
+          <a:off x="0" y="0"/>
+          <a:ext cx="0" cy="0"/>
+          <a:chOff x="0" y="0"/>
+          <a:chExt cx="0" cy="0"/>
+        </a:xfrm>
+      </p:grpSpPr>
+      <p:sp>
+        <p:nvSpPr>
+          <p:cNvPr id="2" name="Title 1"/>
+          <p:cNvSpPr>
+            <a:spLocks noGrp="1"/>
+          </p:cNvSpPr>
+          <p:nvPr>
+            <p:ph type="title"/>
+          </p:nvPr>
+        </p:nvSpPr>
+        <p:spPr/>
+        <p:txBody>
+          <a:bodyPr/>
+          <a:lstStyle/>
+          <a:p>
+            <a:r>
+              <a:rPr lang="en-US" dirty="0" smtClean="0"/>
+              <a:t>The Student View</a:t>
+            </a:r>
+            <a:endParaRPr lang="en-US" dirty="0"/>
+          </a:p>
+        </p:txBody>
+      </p:sp>
+      <p:pic>
+        <p:nvPicPr>
+          <p:cNvPr id="3" name="Picture 2"/>
+          <p:cNvPicPr>
+            <a:picLocks noChangeAspect="1"/>
+          </p:cNvPicPr>
+          <p:nvPr/>
+        </p:nvPicPr>
+        <p:blipFill>
+          <a:blip r:embed="rId2"/>
+          <a:stretch>
+            <a:fillRect/>
+          </a:stretch>
+        </p:blipFill>
+        <p:spPr>
+          <a:xfrm>
+            <a:off x="0" y="1575197"/>
+            <a:ext cx="9144000" cy="2854107"/>
+          </a:xfrm>
+          <a:prstGeom prst="rect">
+            <a:avLst/>
+          </a:prstGeom>
+        </p:spPr>
+      </p:pic>
+      <p:cxnSp>
+        <p:nvCxnSpPr>
+          <p:cNvPr id="7" name="Straight Arrow Connector 6"/>
+          <p:cNvCxnSpPr/>
+          <p:nvPr/>
+        </p:nvCxnSpPr>
+        <p:spPr>
+          <a:xfrm flipH="1">
+            <a:off x="3418970" y="1953946"/>
+            <a:ext cx="1702507" cy="516399"/>
+          </a:xfrm>
+          <a:prstGeom prst="straightConnector1">
+            <a:avLst/>
+          </a:prstGeom>
+          <a:ln>
+            <a:tailEnd type="arrow"/>
+          </a:ln>
+        </p:spPr>
+        <p:style>
+          <a:lnRef idx="2">
+            <a:schemeClr val="accent1"/>
+          </a:lnRef>
+          <a:fillRef idx="0">
+            <a:schemeClr val="accent1"/>
+          </a:fillRef>
+          <a:effectRef idx="1">
+            <a:schemeClr val="accent1"/>
+          </a:effectRef>
+          <a:fontRef idx="minor">
+            <a:schemeClr val="tx1"/>
+          </a:fontRef>
+        </p:style>
+      </p:cxnSp>
+      <p:sp>
+        <p:nvSpPr>
+          <p:cNvPr id="8" name="Rounded Rectangle 7"/>
+          <p:cNvSpPr/>
+          <p:nvPr/>
+        </p:nvSpPr>
+        <p:spPr>
+          <a:xfrm>
+            <a:off x="5168667" y="1505384"/>
+            <a:ext cx="2799626" cy="602086"/>
+          </a:xfrm>
+          <a:prstGeom prst="roundRect">
+            <a:avLst/>
+          </a:prstGeom>
+        </p:spPr>
+        <p:style>
+          <a:lnRef idx="1">
+            <a:schemeClr val="accent1"/>
+          </a:lnRef>
+          <a:fillRef idx="3">
+            <a:schemeClr val="accent1"/>
+          </a:fillRef>
+          <a:effectRef idx="2">
+            <a:schemeClr val="accent1"/>
+          </a:effectRef>
+          <a:fontRef idx="minor">
+            <a:schemeClr val="lt1"/>
+          </a:fontRef>
+        </p:style>
+        <p:txBody>
+          <a:bodyPr rtlCol="0" anchor="ctr"/>
+          <a:lstStyle/>
+          <a:p>
+            <a:pPr algn="ctr"/>
+            <a:r>
+              <a:rPr lang="en-US" dirty="0" smtClean="0"/>
+              <a:t>Wait Estimates are Position and Status Aware</a:t>
+            </a:r>
+            <a:endParaRPr lang="en-US" dirty="0"/>
+          </a:p>
+        </p:txBody>
+      </p:sp>
+      <p:cxnSp>
+        <p:nvCxnSpPr>
+          <p:cNvPr id="10" name="Straight Arrow Connector 9"/>
+          <p:cNvCxnSpPr/>
+          <p:nvPr/>
+        </p:nvCxnSpPr>
+        <p:spPr>
+          <a:xfrm flipV="1">
+            <a:off x="7507779" y="3712497"/>
+            <a:ext cx="558199" cy="907189"/>
+          </a:xfrm>
+          <a:prstGeom prst="straightConnector1">
+            <a:avLst/>
+          </a:prstGeom>
+          <a:ln>
+            <a:tailEnd type="arrow"/>
+          </a:ln>
+        </p:spPr>
+        <p:style>
+          <a:lnRef idx="2">
+            <a:schemeClr val="accent1"/>
+          </a:lnRef>
+          <a:fillRef idx="0">
+            <a:schemeClr val="accent1"/>
+          </a:fillRef>
+          <a:effectRef idx="1">
+            <a:schemeClr val="accent1"/>
+          </a:effectRef>
+          <a:fontRef idx="minor">
+            <a:schemeClr val="tx1"/>
+          </a:fontRef>
+        </p:style>
+      </p:cxnSp>
+      <p:sp>
+        <p:nvSpPr>
+          <p:cNvPr id="12" name="Rounded Rectangle 11"/>
+          <p:cNvSpPr/>
+          <p:nvPr/>
+        </p:nvSpPr>
+        <p:spPr>
+          <a:xfrm>
+            <a:off x="6096499" y="4675514"/>
+            <a:ext cx="2799626" cy="602086"/>
+          </a:xfrm>
+          <a:prstGeom prst="roundRect">
+            <a:avLst/>
+          </a:prstGeom>
+        </p:spPr>
+        <p:style>
+          <a:lnRef idx="1">
+            <a:schemeClr val="accent1"/>
+          </a:lnRef>
+          <a:fillRef idx="3">
+            <a:schemeClr val="accent1"/>
+          </a:fillRef>
+          <a:effectRef idx="2">
+            <a:schemeClr val="accent1"/>
+          </a:effectRef>
+          <a:fontRef idx="minor">
+            <a:schemeClr val="lt1"/>
+          </a:fontRef>
+        </p:style>
+        <p:txBody>
+          <a:bodyPr rtlCol="0" anchor="ctr"/>
+          <a:lstStyle/>
+          <a:p>
+            <a:pPr algn="ctr"/>
+            <a:r>
+              <a:rPr lang="en-US" dirty="0" smtClean="0"/>
+              <a:t>Users Can Only Modify Themselves</a:t>
+            </a:r>
+            <a:endParaRPr lang="en-US" dirty="0"/>
+          </a:p>
+        </p:txBody>
+      </p:sp>
+    </p:spTree>
+    <p:extLst>
+      <p:ext uri="{BB962C8B-B14F-4D97-AF65-F5344CB8AC3E}">
+        <p14:creationId xmlns:p14="http://schemas.microsoft.com/office/powerpoint/2010/main" val="205396143"/>
+      </p:ext>
+    </p:extLst>
+  </p:cSld>
+  <p:clrMapOvr>
+    <a:masterClrMapping/>
+  </p:clrMapOvr>
+</p:sld>
+</file>
+
+<file path=ppt/slides/slide6.xml><?xml version="1.0" encoding="utf-8"?>
+<p:sld xmlns:a="http://schemas.openxmlformats.org/drawingml/2006/main" xmlns:r="http://schemas.openxmlformats.org/officeDocument/2006/relationships" xmlns:p="http://schemas.openxmlformats.org/presentationml/2006/main">
+  <p:cSld>
+    <p:spTree>
+      <p:nvGrpSpPr>
+        <p:cNvPr id="1" name=""/>
+        <p:cNvGrpSpPr/>
+        <p:nvPr/>
+      </p:nvGrpSpPr>
+      <p:grpSpPr>
+        <a:xfrm>
+          <a:off x="0" y="0"/>
+          <a:ext cx="0" cy="0"/>
+          <a:chOff x="0" y="0"/>
+          <a:chExt cx="0" cy="0"/>
+        </a:xfrm>
+      </p:grpSpPr>
+      <p:sp>
+        <p:nvSpPr>
+          <p:cNvPr id="2" name="Title 1"/>
+          <p:cNvSpPr>
+            <a:spLocks noGrp="1"/>
+          </p:cNvSpPr>
+          <p:nvPr>
+            <p:ph type="title"/>
+          </p:nvPr>
+        </p:nvSpPr>
+        <p:spPr/>
+        <p:txBody>
+          <a:bodyPr/>
+          <a:lstStyle/>
+          <a:p>
+            <a:r>
+              <a:rPr lang="en-US" dirty="0" smtClean="0"/>
+              <a:t>Entry Form</a:t>
+            </a:r>
+            <a:endParaRPr lang="en-US" dirty="0"/>
+          </a:p>
+        </p:txBody>
+      </p:sp>
+      <p:pic>
+        <p:nvPicPr>
+          <p:cNvPr id="3" name="Picture 2"/>
+          <p:cNvPicPr>
+            <a:picLocks noChangeAspect="1"/>
+          </p:cNvPicPr>
+          <p:nvPr/>
+        </p:nvPicPr>
+        <p:blipFill>
+          <a:blip r:embed="rId2"/>
+          <a:stretch>
+            <a:fillRect/>
+          </a:stretch>
+        </p:blipFill>
+        <p:spPr>
+          <a:xfrm>
+            <a:off x="0" y="1278062"/>
+            <a:ext cx="9144000" cy="3341077"/>
+          </a:xfrm>
+          <a:prstGeom prst="rect">
+            <a:avLst/>
+          </a:prstGeom>
+        </p:spPr>
+      </p:pic>
+    </p:spTree>
+    <p:extLst>
+      <p:ext uri="{BB962C8B-B14F-4D97-AF65-F5344CB8AC3E}">
+        <p14:creationId xmlns:p14="http://schemas.microsoft.com/office/powerpoint/2010/main" val="2619405915"/>
+      </p:ext>
+    </p:extLst>
+  </p:cSld>
+  <p:clrMapOvr>
+    <a:masterClrMapping/>
+  </p:clrMapOvr>
+</p:sld>
+</file>
+
+<file path=ppt/slides/slide7.xml><?xml version="1.0" encoding="utf-8"?>
+<p:sld xmlns:a="http://schemas.openxmlformats.org/drawingml/2006/main" xmlns:r="http://schemas.openxmlformats.org/officeDocument/2006/relationships" xmlns:p="http://schemas.openxmlformats.org/presentationml/2006/main">
+  <p:cSld>
+    <p:spTree>
+      <p:nvGrpSpPr>
+        <p:cNvPr id="1" name=""/>
+        <p:cNvGrpSpPr/>
+        <p:nvPr/>
+      </p:nvGrpSpPr>
+      <p:grpSpPr>
+        <a:xfrm>
+          <a:off x="0" y="0"/>
+          <a:ext cx="0" cy="0"/>
+          <a:chOff x="0" y="0"/>
+          <a:chExt cx="0" cy="0"/>
+        </a:xfrm>
+      </p:grpSpPr>
+      <p:sp>
+        <p:nvSpPr>
+          <p:cNvPr id="2" name="Title 1"/>
+          <p:cNvSpPr>
+            <a:spLocks noGrp="1"/>
+          </p:cNvSpPr>
+          <p:nvPr>
+            <p:ph type="title"/>
+          </p:nvPr>
+        </p:nvSpPr>
+        <p:spPr/>
+        <p:txBody>
+          <a:bodyPr/>
+          <a:lstStyle/>
+          <a:p>
+            <a:r>
+              <a:rPr lang="en-US" dirty="0" smtClean="0"/>
+              <a:t>Student Notification</a:t>
+            </a:r>
+            <a:endParaRPr lang="en-US" dirty="0"/>
+          </a:p>
+        </p:txBody>
+      </p:sp>
+      <p:pic>
+        <p:nvPicPr>
+          <p:cNvPr id="4" name="Picture 3"/>
+          <p:cNvPicPr>
+            <a:picLocks noChangeAspect="1"/>
+          </p:cNvPicPr>
+          <p:nvPr/>
+        </p:nvPicPr>
+        <p:blipFill>
+          <a:blip r:embed="rId2"/>
+          <a:stretch>
+            <a:fillRect/>
+          </a:stretch>
+        </p:blipFill>
+        <p:spPr>
+          <a:xfrm>
+            <a:off x="724160" y="1287816"/>
+            <a:ext cx="7752165" cy="5144527"/>
+          </a:xfrm>
+          <a:prstGeom prst="rect">
+            <a:avLst/>
+          </a:prstGeom>
+        </p:spPr>
+      </p:pic>
+    </p:spTree>
+    <p:extLst>
+      <p:ext uri="{BB962C8B-B14F-4D97-AF65-F5344CB8AC3E}">
+        <p14:creationId xmlns:p14="http://schemas.microsoft.com/office/powerpoint/2010/main" val="1600811669"/>
+      </p:ext>
+    </p:extLst>
+  </p:cSld>
+  <p:clrMapOvr>
+    <a:masterClrMapping/>
+  </p:clrMapOvr>
+</p:sld>
+</file>
+
+<file path=ppt/slides/slide8.xml><?xml version="1.0" encoding="utf-8"?>
+<p:sld xmlns:a="http://schemas.openxmlformats.org/drawingml/2006/main" xmlns:r="http://schemas.openxmlformats.org/officeDocument/2006/relationships" xmlns:p="http://schemas.openxmlformats.org/presentationml/2006/main">
+  <p:cSld>
+    <p:spTree>
+      <p:nvGrpSpPr>
+        <p:cNvPr id="1" name=""/>
+        <p:cNvGrpSpPr/>
+        <p:nvPr/>
+      </p:nvGrpSpPr>
+      <p:grpSpPr>
+        <a:xfrm>
+          <a:off x="0" y="0"/>
+          <a:ext cx="0" cy="0"/>
+          <a:chOff x="0" y="0"/>
+          <a:chExt cx="0" cy="0"/>
+        </a:xfrm>
+      </p:grpSpPr>
+      <p:pic>
+        <p:nvPicPr>
+          <p:cNvPr id="3" name="Picture 2"/>
+          <p:cNvPicPr>
+            <a:picLocks noChangeAspect="1"/>
+          </p:cNvPicPr>
+          <p:nvPr/>
+        </p:nvPicPr>
+        <p:blipFill>
+          <a:blip r:embed="rId2"/>
+          <a:stretch>
+            <a:fillRect/>
+          </a:stretch>
+        </p:blipFill>
+        <p:spPr>
+          <a:xfrm>
+            <a:off x="0" y="1244600"/>
+            <a:ext cx="9144000" cy="4355024"/>
+          </a:xfrm>
+          <a:prstGeom prst="rect">
+            <a:avLst/>
+          </a:prstGeom>
+        </p:spPr>
+      </p:pic>
+      <p:sp>
+        <p:nvSpPr>
+          <p:cNvPr id="4" name="Title 3"/>
+          <p:cNvSpPr>
+            <a:spLocks noGrp="1"/>
+          </p:cNvSpPr>
+          <p:nvPr>
+            <p:ph type="title"/>
+          </p:nvPr>
+        </p:nvSpPr>
+        <p:spPr/>
+        <p:txBody>
+          <a:bodyPr/>
+          <a:lstStyle/>
+          <a:p>
+            <a:r>
+              <a:rPr lang="en-US" dirty="0" smtClean="0"/>
+              <a:t>TA Facebook</a:t>
+            </a:r>
+            <a:endParaRPr lang="en-US" dirty="0"/>
+          </a:p>
+        </p:txBody>
+      </p:sp>
+      <p:cxnSp>
+        <p:nvCxnSpPr>
+          <p:cNvPr id="6" name="Straight Arrow Connector 5"/>
+          <p:cNvCxnSpPr/>
+          <p:nvPr/>
+        </p:nvCxnSpPr>
+        <p:spPr>
+          <a:xfrm flipV="1">
+            <a:off x="8121798" y="3357630"/>
+            <a:ext cx="293055" cy="1024792"/>
+          </a:xfrm>
+          <a:prstGeom prst="straightConnector1">
+            <a:avLst/>
+          </a:prstGeom>
+          <a:ln>
+            <a:tailEnd type="arrow"/>
+          </a:ln>
+        </p:spPr>
+        <p:style>
+          <a:lnRef idx="2">
+            <a:schemeClr val="accent1"/>
+          </a:lnRef>
+          <a:fillRef idx="0">
+            <a:schemeClr val="accent1"/>
+          </a:fillRef>
+          <a:effectRef idx="1">
+            <a:schemeClr val="accent1"/>
+          </a:effectRef>
+          <a:fontRef idx="minor">
+            <a:schemeClr val="tx1"/>
+          </a:fontRef>
+        </p:style>
+      </p:cxnSp>
+      <p:sp>
+        <p:nvSpPr>
+          <p:cNvPr id="11" name="Rounded Rectangle 10"/>
+          <p:cNvSpPr/>
+          <p:nvPr/>
+        </p:nvSpPr>
+        <p:spPr>
+          <a:xfrm>
+            <a:off x="6991445" y="4422346"/>
+            <a:ext cx="2101878" cy="299043"/>
+          </a:xfrm>
+          <a:prstGeom prst="roundRect">
+            <a:avLst/>
+          </a:prstGeom>
+        </p:spPr>
+        <p:style>
+          <a:lnRef idx="1">
+            <a:schemeClr val="accent1"/>
+          </a:lnRef>
+          <a:fillRef idx="3">
+            <a:schemeClr val="accent1"/>
+          </a:fillRef>
+          <a:effectRef idx="2">
+            <a:schemeClr val="accent1"/>
+          </a:effectRef>
+          <a:fontRef idx="minor">
+            <a:schemeClr val="lt1"/>
+          </a:fontRef>
+        </p:style>
+        <p:txBody>
+          <a:bodyPr rtlCol="0" anchor="ctr"/>
+          <a:lstStyle/>
+          <a:p>
+            <a:pPr algn="ctr"/>
+            <a:r>
+              <a:rPr lang="en-US" dirty="0" smtClean="0"/>
+              <a:t>Fun Profile Pictures!</a:t>
+            </a:r>
+            <a:endParaRPr lang="en-US" dirty="0"/>
+          </a:p>
+        </p:txBody>
+      </p:sp>
+      <p:sp>
+        <p:nvSpPr>
+          <p:cNvPr id="12" name="Left Brace 11"/>
+          <p:cNvSpPr/>
+          <p:nvPr/>
+        </p:nvSpPr>
+        <p:spPr>
+          <a:xfrm>
+            <a:off x="3753889" y="4019545"/>
+            <a:ext cx="83730" cy="516400"/>
+          </a:xfrm>
+          <a:prstGeom prst="leftBrace">
+            <a:avLst/>
+          </a:prstGeom>
+        </p:spPr>
+        <p:style>
+          <a:lnRef idx="2">
+            <a:schemeClr val="accent1"/>
+          </a:lnRef>
+          <a:fillRef idx="0">
+            <a:schemeClr val="accent1"/>
+          </a:fillRef>
+          <a:effectRef idx="1">
+            <a:schemeClr val="accent1"/>
+          </a:effectRef>
+          <a:fontRef idx="minor">
+            <a:schemeClr val="tx1"/>
+          </a:fontRef>
+        </p:style>
+        <p:txBody>
+          <a:bodyPr rtlCol="0" anchor="ctr"/>
+          <a:lstStyle/>
+          <a:p>
+            <a:pPr algn="ctr"/>
+            <a:endParaRPr lang="en-US"/>
+          </a:p>
+        </p:txBody>
+      </p:sp>
+      <p:sp>
+        <p:nvSpPr>
+          <p:cNvPr id="13" name="Rounded Rectangle 12"/>
+          <p:cNvSpPr/>
+          <p:nvPr/>
+        </p:nvSpPr>
+        <p:spPr>
+          <a:xfrm>
+            <a:off x="1772282" y="4123303"/>
+            <a:ext cx="1403024" cy="259119"/>
+          </a:xfrm>
+          <a:prstGeom prst="roundRect">
+            <a:avLst/>
+          </a:prstGeom>
+        </p:spPr>
+        <p:style>
+          <a:lnRef idx="1">
+            <a:schemeClr val="accent1"/>
+          </a:lnRef>
+          <a:fillRef idx="3">
+            <a:schemeClr val="accent1"/>
+          </a:fillRef>
+          <a:effectRef idx="2">
+            <a:schemeClr val="accent1"/>
+          </a:effectRef>
+          <a:fontRef idx="minor">
+            <a:schemeClr val="lt1"/>
+          </a:fontRef>
+        </p:style>
+        <p:txBody>
+          <a:bodyPr rtlCol="0" anchor="ctr"/>
+          <a:lstStyle/>
+          <a:p>
+            <a:pPr algn="ctr"/>
+            <a:r>
+              <a:rPr lang="en-US" dirty="0" smtClean="0"/>
+              <a:t>Basic Info</a:t>
+            </a:r>
+            <a:endParaRPr lang="en-US" dirty="0"/>
+          </a:p>
+        </p:txBody>
+      </p:sp>
+      <p:cxnSp>
+        <p:nvCxnSpPr>
+          <p:cNvPr id="14" name="Straight Arrow Connector 13"/>
+          <p:cNvCxnSpPr/>
+          <p:nvPr/>
+        </p:nvCxnSpPr>
+        <p:spPr>
+          <a:xfrm>
+            <a:off x="3237555" y="4284724"/>
+            <a:ext cx="404694" cy="0"/>
+          </a:xfrm>
+          <a:prstGeom prst="straightConnector1">
+            <a:avLst/>
+          </a:prstGeom>
+          <a:ln>
+            <a:tailEnd type="arrow"/>
+          </a:ln>
+        </p:spPr>
+        <p:style>
+          <a:lnRef idx="2">
+            <a:schemeClr val="accent1"/>
+          </a:lnRef>
+          <a:fillRef idx="0">
+            <a:schemeClr val="accent1"/>
+          </a:fillRef>
+          <a:effectRef idx="1">
+            <a:schemeClr val="accent1"/>
+          </a:effectRef>
+          <a:fontRef idx="minor">
+            <a:schemeClr val="tx1"/>
+          </a:fontRef>
+        </p:style>
+      </p:cxnSp>
+    </p:spTree>
+    <p:extLst>
+      <p:ext uri="{BB962C8B-B14F-4D97-AF65-F5344CB8AC3E}">
+        <p14:creationId xmlns:p14="http://schemas.microsoft.com/office/powerpoint/2010/main" val="1906633665"/>
+      </p:ext>
+    </p:extLst>
+  </p:cSld>
+  <p:clrMapOvr>
+    <a:masterClrMapping/>
+  </p:clrMapOvr>
+</p:sld>
+</file>
+
+<file path=ppt/slides/slide9.xml><?xml version="1.0" encoding="utf-8"?>
+<p:sld xmlns:a="http://schemas.openxmlformats.org/drawingml/2006/main" xmlns:r="http://schemas.openxmlformats.org/officeDocument/2006/relationships" xmlns:p="http://schemas.openxmlformats.org/presentationml/2006/main">
+  <p:cSld>
+    <p:spTree>
+      <p:nvGrpSpPr>
+        <p:cNvPr id="1" name=""/>
+        <p:cNvGrpSpPr/>
+        <p:nvPr/>
+      </p:nvGrpSpPr>
+      <p:grpSpPr>
+        <a:xfrm>
+          <a:off x="0" y="0"/>
+          <a:ext cx="0" cy="0"/>
+          <a:chOff x="0" y="0"/>
+          <a:chExt cx="0" cy="0"/>
+        </a:xfrm>
+      </p:grpSpPr>
+      <p:sp>
+        <p:nvSpPr>
+          <p:cNvPr id="2" name="Title 1"/>
+          <p:cNvSpPr>
+            <a:spLocks noGrp="1"/>
+          </p:cNvSpPr>
+          <p:nvPr>
+            <p:ph type="title"/>
+          </p:nvPr>
+        </p:nvSpPr>
+        <p:spPr/>
+        <p:txBody>
+          <a:bodyPr/>
+          <a:lstStyle/>
+          <a:p>
+            <a:r>
+              <a:rPr lang="en-US" dirty="0" smtClean="0"/>
+              <a:t>Design</a:t>
+            </a:r>
+            <a:endParaRPr lang="en-US" dirty="0"/>
+          </a:p>
+        </p:txBody>
+      </p:sp>
+      <p:sp>
+        <p:nvSpPr>
+          <p:cNvPr id="3" name="Rounded Rectangle 2"/>
+          <p:cNvSpPr/>
+          <p:nvPr/>
+        </p:nvSpPr>
+        <p:spPr>
+          <a:xfrm>
+            <a:off x="614019" y="1417638"/>
+            <a:ext cx="2637491" cy="5072253"/>
+          </a:xfrm>
+          <a:prstGeom prst="roundRect">
+            <a:avLst/>
+          </a:prstGeom>
+        </p:spPr>
+        <p:style>
+          <a:lnRef idx="1">
+            <a:schemeClr val="accent1"/>
+          </a:lnRef>
+          <a:fillRef idx="3">
+            <a:schemeClr val="accent1"/>
+          </a:fillRef>
+          <a:effectRef idx="2">
+            <a:schemeClr val="accent1"/>
+          </a:effectRef>
+          <a:fontRef idx="minor">
+            <a:schemeClr val="lt1"/>
+          </a:fontRef>
+        </p:style>
+        <p:txBody>
+          <a:bodyPr rtlCol="0" anchor="t" anchorCtr="0"/>
+          <a:lstStyle/>
+          <a:p>
+            <a:pPr algn="ctr"/>
+            <a:r>
+              <a:rPr lang="en-US" dirty="0" smtClean="0"/>
+              <a:t>Model</a:t>
+            </a:r>
+            <a:endParaRPr lang="en-US" dirty="0"/>
+          </a:p>
+        </p:txBody>
+      </p:sp>
+      <p:sp>
+        <p:nvSpPr>
+          <p:cNvPr id="4" name="Rounded Rectangle 3"/>
+          <p:cNvSpPr/>
+          <p:nvPr/>
+        </p:nvSpPr>
+        <p:spPr>
+          <a:xfrm>
+            <a:off x="865210" y="2079554"/>
+            <a:ext cx="2163020" cy="516400"/>
+          </a:xfrm>
+          <a:prstGeom prst="roundRect">
+            <a:avLst/>
+          </a:prstGeom>
+          <a:solidFill>
+            <a:srgbClr val="C0504D"/>
+          </a:solidFill>
+        </p:spPr>
+        <p:style>
+          <a:lnRef idx="1">
+            <a:schemeClr val="accent1"/>
+          </a:lnRef>
+          <a:fillRef idx="3">
+            <a:schemeClr val="accent1"/>
+          </a:fillRef>
+          <a:effectRef idx="2">
+            <a:schemeClr val="accent1"/>
+          </a:effectRef>
+          <a:fontRef idx="minor">
+            <a:schemeClr val="lt1"/>
+          </a:fontRef>
+        </p:style>
+        <p:txBody>
+          <a:bodyPr rtlCol="0" anchor="ctr"/>
+          <a:lstStyle/>
+          <a:p>
+            <a:pPr algn="ctr"/>
+            <a:r>
+              <a:rPr lang="en-US" dirty="0" err="1" smtClean="0"/>
+              <a:t>LabTA</a:t>
+            </a:r>
+            <a:endParaRPr lang="en-US" dirty="0"/>
+          </a:p>
+        </p:txBody>
+      </p:sp>
+      <p:sp>
+        <p:nvSpPr>
+          <p:cNvPr id="6" name="Rounded Rectangle 5"/>
+          <p:cNvSpPr/>
+          <p:nvPr/>
+        </p:nvSpPr>
+        <p:spPr>
+          <a:xfrm>
+            <a:off x="865210" y="3027489"/>
+            <a:ext cx="2163020" cy="516400"/>
+          </a:xfrm>
+          <a:prstGeom prst="roundRect">
+            <a:avLst/>
+          </a:prstGeom>
+          <a:solidFill>
+            <a:srgbClr val="C0504D"/>
+          </a:solidFill>
+        </p:spPr>
+        <p:style>
+          <a:lnRef idx="1">
+            <a:schemeClr val="accent1"/>
+          </a:lnRef>
+          <a:fillRef idx="3">
+            <a:schemeClr val="accent1"/>
+          </a:fillRef>
+          <a:effectRef idx="2">
+            <a:schemeClr val="accent1"/>
+          </a:effectRef>
+          <a:fontRef idx="minor">
+            <a:schemeClr val="lt1"/>
+          </a:fontRef>
+        </p:style>
+        <p:txBody>
+          <a:bodyPr rtlCol="0" anchor="ctr"/>
+          <a:lstStyle/>
+          <a:p>
+            <a:pPr algn="ctr"/>
+            <a:r>
+              <a:rPr lang="en-US" dirty="0" err="1" smtClean="0"/>
+              <a:t>HelpRequest</a:t>
+            </a:r>
+            <a:endParaRPr lang="en-US" dirty="0"/>
+          </a:p>
+        </p:txBody>
+      </p:sp>
+      <p:sp>
+        <p:nvSpPr>
+          <p:cNvPr id="8" name="Rounded Rectangle 7"/>
+          <p:cNvSpPr/>
+          <p:nvPr/>
+        </p:nvSpPr>
+        <p:spPr>
+          <a:xfrm>
+            <a:off x="865210" y="3975427"/>
+            <a:ext cx="2163020" cy="516400"/>
+          </a:xfrm>
+          <a:prstGeom prst="roundRect">
+            <a:avLst/>
+          </a:prstGeom>
+          <a:solidFill>
+            <a:srgbClr val="C0504D"/>
+          </a:solidFill>
+        </p:spPr>
+        <p:style>
+          <a:lnRef idx="1">
+            <a:schemeClr val="accent1"/>
+          </a:lnRef>
+          <a:fillRef idx="3">
+            <a:schemeClr val="accent1"/>
+          </a:fillRef>
+          <a:effectRef idx="2">
+            <a:schemeClr val="accent1"/>
+          </a:effectRef>
+          <a:fontRef idx="minor">
+            <a:schemeClr val="lt1"/>
+          </a:fontRef>
+        </p:style>
+        <p:txBody>
+          <a:bodyPr rtlCol="0" anchor="ctr"/>
+          <a:lstStyle/>
+          <a:p>
+            <a:pPr algn="ctr"/>
+            <a:r>
+              <a:rPr lang="en-US" dirty="0" err="1" smtClean="0"/>
+              <a:t>QueueManager</a:t>
+            </a:r>
+            <a:endParaRPr lang="en-US" dirty="0"/>
+          </a:p>
+        </p:txBody>
+      </p:sp>
+      <p:cxnSp>
+        <p:nvCxnSpPr>
+          <p:cNvPr id="10" name="Straight Arrow Connector 9"/>
+          <p:cNvCxnSpPr/>
+          <p:nvPr/>
+        </p:nvCxnSpPr>
+        <p:spPr>
+          <a:xfrm>
+            <a:off x="2609581" y="3543889"/>
+            <a:ext cx="0" cy="431538"/>
+          </a:xfrm>
+          <a:prstGeom prst="straightConnector1">
+            <a:avLst/>
+          </a:prstGeom>
+          <a:ln>
+            <a:headEnd type="arrow"/>
+            <a:tailEnd type="arrow"/>
+          </a:ln>
+        </p:spPr>
+        <p:style>
+          <a:lnRef idx="2">
+            <a:schemeClr val="accent1"/>
+          </a:lnRef>
+          <a:fillRef idx="0">
+            <a:schemeClr val="accent1"/>
+          </a:fillRef>
+          <a:effectRef idx="1">
+            <a:schemeClr val="accent1"/>
+          </a:effectRef>
+          <a:fontRef idx="minor">
+            <a:schemeClr val="tx1"/>
+          </a:fontRef>
+        </p:style>
+      </p:cxnSp>
+      <p:cxnSp>
+        <p:nvCxnSpPr>
+          <p:cNvPr id="12" name="Straight Arrow Connector 11"/>
+          <p:cNvCxnSpPr/>
+          <p:nvPr/>
+        </p:nvCxnSpPr>
+        <p:spPr>
+          <a:xfrm>
+            <a:off x="2050276" y="3556719"/>
+            <a:ext cx="0" cy="431538"/>
+          </a:xfrm>
+          <a:prstGeom prst="straightConnector1">
+            <a:avLst/>
+          </a:prstGeom>
+          <a:ln>
+            <a:headEnd type="arrow"/>
+            <a:tailEnd type="arrow"/>
+          </a:ln>
+        </p:spPr>
+        <p:style>
+          <a:lnRef idx="2">
+            <a:schemeClr val="accent1"/>
+          </a:lnRef>
+          <a:fillRef idx="0">
+            <a:schemeClr val="accent1"/>
+          </a:fillRef>
+          <a:effectRef idx="1">
+            <a:schemeClr val="accent1"/>
+          </a:effectRef>
+          <a:fontRef idx="minor">
+            <a:schemeClr val="tx1"/>
+          </a:fontRef>
+        </p:style>
+      </p:cxnSp>
+      <p:cxnSp>
+        <p:nvCxnSpPr>
+          <p:cNvPr id="13" name="Straight Arrow Connector 12"/>
+          <p:cNvCxnSpPr/>
+          <p:nvPr/>
+        </p:nvCxnSpPr>
+        <p:spPr>
+          <a:xfrm>
+            <a:off x="1463061" y="3541635"/>
+            <a:ext cx="0" cy="431538"/>
+          </a:xfrm>
+          <a:prstGeom prst="straightConnector1">
+            <a:avLst/>
+          </a:prstGeom>
+          <a:ln>
+            <a:headEnd type="arrow"/>
+            <a:tailEnd type="arrow"/>
+          </a:ln>
+        </p:spPr>
+        <p:style>
+          <a:lnRef idx="2">
+            <a:schemeClr val="accent1"/>
+          </a:lnRef>
+          <a:fillRef idx="0">
+            <a:schemeClr val="accent1"/>
+          </a:fillRef>
+          <a:effectRef idx="1">
+            <a:schemeClr val="accent1"/>
+          </a:effectRef>
+          <a:fontRef idx="minor">
+            <a:schemeClr val="tx1"/>
+          </a:fontRef>
+        </p:style>
+      </p:cxnSp>
+      <p:sp>
+        <p:nvSpPr>
+          <p:cNvPr id="14" name="Rounded Rectangle 13"/>
+          <p:cNvSpPr/>
+          <p:nvPr/>
+        </p:nvSpPr>
+        <p:spPr>
+          <a:xfrm>
+            <a:off x="865210" y="4870907"/>
+            <a:ext cx="2163020" cy="1325892"/>
+          </a:xfrm>
+          <a:prstGeom prst="roundRect">
+            <a:avLst/>
+          </a:prstGeom>
+          <a:solidFill>
+            <a:srgbClr val="C0504D"/>
+          </a:solidFill>
+        </p:spPr>
+        <p:style>
+          <a:lnRef idx="1">
+            <a:schemeClr val="accent1"/>
+          </a:lnRef>
+          <a:fillRef idx="3">
+            <a:schemeClr val="accent1"/>
+          </a:fillRef>
+          <a:effectRef idx="2">
+            <a:schemeClr val="accent1"/>
+          </a:effectRef>
+          <a:fontRef idx="minor">
+            <a:schemeClr val="lt1"/>
+          </a:fontRef>
+        </p:style>
+        <p:txBody>
+          <a:bodyPr rtlCol="0" anchor="ctr"/>
+          <a:lstStyle/>
+          <a:p>
+            <a:pPr algn="ctr"/>
+            <a:r>
+              <a:rPr lang="en-US" dirty="0" smtClean="0"/>
+              <a:t>Main Page</a:t>
+            </a:r>
+          </a:p>
+          <a:p>
+            <a:pPr algn="ctr"/>
+            <a:r>
+              <a:rPr lang="en-US" dirty="0" smtClean="0"/>
+              <a:t>And</a:t>
+            </a:r>
+          </a:p>
+          <a:p>
+            <a:pPr algn="ctr"/>
+            <a:r>
+              <a:rPr lang="en-US" dirty="0" err="1" smtClean="0"/>
+              <a:t>TAFacebook</a:t>
+            </a:r>
+            <a:endParaRPr lang="en-US" dirty="0"/>
+          </a:p>
+          <a:p>
+            <a:pPr algn="ctr"/>
+            <a:r>
+              <a:rPr lang="en-US" dirty="0" smtClean="0"/>
+              <a:t>Page Data</a:t>
+            </a:r>
+            <a:endParaRPr lang="en-US" dirty="0"/>
+          </a:p>
+        </p:txBody>
+      </p:sp>
+      <p:sp>
+        <p:nvSpPr>
+          <p:cNvPr id="15" name="Rounded Rectangle 14"/>
+          <p:cNvSpPr/>
+          <p:nvPr/>
+        </p:nvSpPr>
+        <p:spPr>
+          <a:xfrm>
+            <a:off x="5749451" y="2324831"/>
+            <a:ext cx="3195692" cy="1904069"/>
+          </a:xfrm>
+          <a:prstGeom prst="roundRect">
+            <a:avLst/>
+          </a:prstGeom>
+        </p:spPr>
+        <p:style>
+          <a:lnRef idx="1">
+            <a:schemeClr val="accent1"/>
+          </a:lnRef>
+          <a:fillRef idx="3">
+            <a:schemeClr val="accent1"/>
+          </a:fillRef>
+          <a:effectRef idx="2">
+            <a:schemeClr val="accent1"/>
+          </a:effectRef>
+          <a:fontRef idx="minor">
+            <a:schemeClr val="lt1"/>
+          </a:fontRef>
+        </p:style>
+        <p:txBody>
+          <a:bodyPr rtlCol="0" anchor="t" anchorCtr="0"/>
+          <a:lstStyle/>
+          <a:p>
+            <a:pPr algn="ctr"/>
+            <a:r>
+              <a:rPr lang="en-US" dirty="0" smtClean="0"/>
+              <a:t>Controller</a:t>
+            </a:r>
+            <a:endParaRPr lang="en-US" dirty="0"/>
+          </a:p>
+        </p:txBody>
+      </p:sp>
+      <p:sp>
+        <p:nvSpPr>
+          <p:cNvPr id="16" name="Rounded Rectangle 15"/>
+          <p:cNvSpPr/>
+          <p:nvPr/>
+        </p:nvSpPr>
+        <p:spPr>
+          <a:xfrm>
+            <a:off x="4758649" y="4491827"/>
+            <a:ext cx="4186494" cy="1904069"/>
+          </a:xfrm>
+          <a:prstGeom prst="roundRect">
+            <a:avLst/>
+          </a:prstGeom>
+        </p:spPr>
+        <p:style>
+          <a:lnRef idx="1">
+            <a:schemeClr val="accent1"/>
+          </a:lnRef>
+          <a:fillRef idx="3">
+            <a:schemeClr val="accent1"/>
+          </a:fillRef>
+          <a:effectRef idx="2">
+            <a:schemeClr val="accent1"/>
+          </a:effectRef>
+          <a:fontRef idx="minor">
+            <a:schemeClr val="lt1"/>
+          </a:fontRef>
+        </p:style>
+        <p:txBody>
+          <a:bodyPr rtlCol="0" anchor="t" anchorCtr="0"/>
+          <a:lstStyle/>
+          <a:p>
+            <a:pPr algn="ctr"/>
+            <a:r>
+              <a:rPr lang="en-US" dirty="0" smtClean="0"/>
+              <a:t>View</a:t>
+            </a:r>
+            <a:endParaRPr lang="en-US" dirty="0"/>
+          </a:p>
+        </p:txBody>
+      </p:sp>
+      <p:sp>
+        <p:nvSpPr>
+          <p:cNvPr id="17" name="Rounded Rectangle 16"/>
+          <p:cNvSpPr/>
+          <p:nvPr/>
+        </p:nvSpPr>
+        <p:spPr>
+          <a:xfrm>
+            <a:off x="3448956" y="1417638"/>
+            <a:ext cx="2174900" cy="1388789"/>
+          </a:xfrm>
+          <a:prstGeom prst="roundRect">
+            <a:avLst/>
+          </a:prstGeom>
+        </p:spPr>
+        <p:style>
+          <a:lnRef idx="1">
+            <a:schemeClr val="accent1"/>
+          </a:lnRef>
+          <a:fillRef idx="3">
+            <a:schemeClr val="accent1"/>
+          </a:fillRef>
+          <a:effectRef idx="2">
+            <a:schemeClr val="accent1"/>
+          </a:effectRef>
+          <a:fontRef idx="minor">
+            <a:schemeClr val="lt1"/>
+          </a:fontRef>
+        </p:style>
+        <p:txBody>
+          <a:bodyPr rtlCol="0" anchor="ctr" anchorCtr="0"/>
+          <a:lstStyle/>
+          <a:p>
+            <a:pPr algn="ctr"/>
+            <a:r>
+              <a:rPr lang="en-US" dirty="0" err="1" smtClean="0"/>
+              <a:t>ChannelManager</a:t>
+            </a:r>
+            <a:endParaRPr lang="en-US" dirty="0"/>
+          </a:p>
+        </p:txBody>
+      </p:sp>
+      <p:sp>
+        <p:nvSpPr>
+          <p:cNvPr id="18" name="Right Arrow 17"/>
+          <p:cNvSpPr/>
+          <p:nvPr/>
+        </p:nvSpPr>
+        <p:spPr>
+          <a:xfrm>
+            <a:off x="3028230" y="5387305"/>
+            <a:ext cx="1730419" cy="362876"/>
+          </a:xfrm>
+          <a:prstGeom prst="rightArrow">
+            <a:avLst/>
+          </a:prstGeom>
+        </p:spPr>
+        <p:style>
+          <a:lnRef idx="1">
+            <a:schemeClr val="accent1"/>
+          </a:lnRef>
+          <a:fillRef idx="3">
+            <a:schemeClr val="accent1"/>
+          </a:fillRef>
+          <a:effectRef idx="2">
+            <a:schemeClr val="accent1"/>
+          </a:effectRef>
+          <a:fontRef idx="minor">
+            <a:schemeClr val="lt1"/>
+          </a:fontRef>
+        </p:style>
+        <p:txBody>
+          <a:bodyPr rtlCol="0" anchor="ctr"/>
+          <a:lstStyle/>
+          <a:p>
+            <a:pPr algn="ctr"/>
+            <a:endParaRPr lang="en-US"/>
+          </a:p>
+        </p:txBody>
+      </p:sp>
+      <p:sp>
+        <p:nvSpPr>
+          <p:cNvPr id="19" name="Rounded Rectangle 18"/>
+          <p:cNvSpPr/>
+          <p:nvPr/>
+        </p:nvSpPr>
+        <p:spPr>
+          <a:xfrm>
+            <a:off x="4856333" y="4982563"/>
+            <a:ext cx="1869967" cy="1214236"/>
+          </a:xfrm>
+          <a:prstGeom prst="roundRect">
+            <a:avLst/>
+          </a:prstGeom>
+          <a:solidFill>
+            <a:srgbClr val="C0504D"/>
+          </a:solidFill>
+        </p:spPr>
+        <p:style>
+          <a:lnRef idx="1">
+            <a:schemeClr val="accent1"/>
+          </a:lnRef>
+          <a:fillRef idx="3">
+            <a:schemeClr val="accent1"/>
+          </a:fillRef>
+          <a:effectRef idx="2">
+            <a:schemeClr val="accent1"/>
+          </a:effectRef>
+          <a:fontRef idx="minor">
+            <a:schemeClr val="lt1"/>
+          </a:fontRef>
+        </p:style>
+        <p:txBody>
+          <a:bodyPr rtlCol="0" anchor="ctr"/>
+          <a:lstStyle/>
+          <a:p>
+            <a:pPr algn="ctr"/>
+            <a:r>
+              <a:rPr lang="en-US" dirty="0" smtClean="0"/>
+              <a:t>Static Templates</a:t>
+            </a:r>
+            <a:endParaRPr lang="en-US" dirty="0"/>
+          </a:p>
+        </p:txBody>
+      </p:sp>
+      <p:sp>
+        <p:nvSpPr>
+          <p:cNvPr id="20" name="Rounded Rectangle 19"/>
+          <p:cNvSpPr/>
+          <p:nvPr/>
+        </p:nvSpPr>
+        <p:spPr>
+          <a:xfrm>
+            <a:off x="6962430" y="4968603"/>
+            <a:ext cx="1869967" cy="1228195"/>
+          </a:xfrm>
+          <a:prstGeom prst="roundRect">
+            <a:avLst/>
+          </a:prstGeom>
+          <a:solidFill>
+            <a:srgbClr val="C0504D"/>
+          </a:solidFill>
+        </p:spPr>
+        <p:style>
+          <a:lnRef idx="1">
+            <a:schemeClr val="accent1"/>
+          </a:lnRef>
+          <a:fillRef idx="3">
+            <a:schemeClr val="accent1"/>
+          </a:fillRef>
+          <a:effectRef idx="2">
+            <a:schemeClr val="accent1"/>
+          </a:effectRef>
+          <a:fontRef idx="minor">
+            <a:schemeClr val="lt1"/>
+          </a:fontRef>
+        </p:style>
+        <p:txBody>
+          <a:bodyPr rtlCol="0" anchor="ctr"/>
+          <a:lstStyle/>
+          <a:p>
+            <a:pPr algn="ctr"/>
+            <a:r>
+              <a:rPr lang="en-US" dirty="0" smtClean="0"/>
+              <a:t>JavaScript</a:t>
+            </a:r>
+          </a:p>
+          <a:p>
+            <a:pPr algn="ctr"/>
+            <a:r>
+              <a:rPr lang="en-US" dirty="0" smtClean="0"/>
+              <a:t>Modification</a:t>
+            </a:r>
+          </a:p>
+          <a:p>
+            <a:pPr algn="ctr"/>
+            <a:r>
+              <a:rPr lang="en-US" dirty="0" smtClean="0"/>
+              <a:t>of DOM</a:t>
+            </a:r>
+            <a:endParaRPr lang="en-US" dirty="0"/>
+          </a:p>
+        </p:txBody>
+      </p:sp>
+      <p:sp>
+        <p:nvSpPr>
+          <p:cNvPr id="21" name="Rounded Rectangle 20"/>
+          <p:cNvSpPr/>
+          <p:nvPr/>
+        </p:nvSpPr>
+        <p:spPr>
+          <a:xfrm>
+            <a:off x="6027446" y="2806425"/>
+            <a:ext cx="2659354" cy="1214236"/>
+          </a:xfrm>
+          <a:prstGeom prst="roundRect">
+            <a:avLst/>
+          </a:prstGeom>
+          <a:solidFill>
+            <a:srgbClr val="C0504D"/>
+          </a:solidFill>
+        </p:spPr>
+        <p:style>
+          <a:lnRef idx="1">
+            <a:schemeClr val="accent1"/>
+          </a:lnRef>
+          <a:fillRef idx="3">
+            <a:schemeClr val="accent1"/>
+          </a:fillRef>
+          <a:effectRef idx="2">
+            <a:schemeClr val="accent1"/>
+          </a:effectRef>
+          <a:fontRef idx="minor">
+            <a:schemeClr val="lt1"/>
+          </a:fontRef>
+        </p:style>
+        <p:txBody>
+          <a:bodyPr rtlCol="0" anchor="ctr"/>
+          <a:lstStyle/>
+          <a:p>
+            <a:pPr algn="ctr"/>
+            <a:r>
+              <a:rPr lang="en-US" dirty="0" err="1" smtClean="0"/>
+              <a:t>jQuery</a:t>
+            </a:r>
+            <a:r>
+              <a:rPr lang="en-US" dirty="0" smtClean="0"/>
+              <a:t> Event Handlers</a:t>
+            </a:r>
+            <a:endParaRPr lang="en-US" dirty="0"/>
+          </a:p>
+        </p:txBody>
+      </p:sp>
+      <p:sp>
+        <p:nvSpPr>
+          <p:cNvPr id="22" name="Left Arrow 21"/>
+          <p:cNvSpPr/>
+          <p:nvPr/>
+        </p:nvSpPr>
+        <p:spPr>
+          <a:xfrm>
+            <a:off x="3251510" y="3402547"/>
+            <a:ext cx="2775936" cy="484632"/>
+          </a:xfrm>
+          <a:prstGeom prst="leftArrow">
+            <a:avLst/>
+          </a:prstGeom>
+        </p:spPr>
+        <p:style>
+          <a:lnRef idx="1">
+            <a:schemeClr val="accent1"/>
+          </a:lnRef>
+          <a:fillRef idx="3">
+            <a:schemeClr val="accent1"/>
+          </a:fillRef>
+          <a:effectRef idx="2">
+            <a:schemeClr val="accent1"/>
+          </a:effectRef>
+          <a:fontRef idx="minor">
+            <a:schemeClr val="lt1"/>
+          </a:fontRef>
+        </p:style>
+        <p:txBody>
+          <a:bodyPr rtlCol="0" anchor="ctr"/>
+          <a:lstStyle/>
+          <a:p>
+            <a:pPr algn="ctr"/>
+            <a:r>
+              <a:rPr lang="en-US" dirty="0" smtClean="0"/>
+              <a:t>Client-to-Server</a:t>
+            </a:r>
+            <a:endParaRPr lang="en-US" dirty="0"/>
+          </a:p>
+        </p:txBody>
+      </p:sp>
+      <p:sp>
+        <p:nvSpPr>
+          <p:cNvPr id="23" name="Bent-Up Arrow 22"/>
+          <p:cNvSpPr/>
+          <p:nvPr/>
+        </p:nvSpPr>
+        <p:spPr>
+          <a:xfrm>
+            <a:off x="3251510" y="2806426"/>
+            <a:ext cx="1334778" cy="487367"/>
+          </a:xfrm>
+          <a:prstGeom prst="bentUpArrow">
+            <a:avLst/>
+          </a:prstGeom>
+        </p:spPr>
+        <p:style>
+          <a:lnRef idx="1">
+            <a:schemeClr val="accent1"/>
+          </a:lnRef>
+          <a:fillRef idx="3">
+            <a:schemeClr val="accent1"/>
+          </a:fillRef>
+          <a:effectRef idx="2">
+            <a:schemeClr val="accent1"/>
+          </a:effectRef>
+          <a:fontRef idx="minor">
+            <a:schemeClr val="lt1"/>
+          </a:fontRef>
+        </p:style>
+        <p:txBody>
+          <a:bodyPr rtlCol="0" anchor="ctr"/>
+          <a:lstStyle/>
+          <a:p>
+            <a:pPr algn="ctr"/>
+            <a:endParaRPr lang="en-US"/>
+          </a:p>
+        </p:txBody>
+      </p:sp>
+      <p:sp>
+        <p:nvSpPr>
+          <p:cNvPr id="25" name="Bent-Up Arrow 24"/>
+          <p:cNvSpPr/>
+          <p:nvPr/>
+        </p:nvSpPr>
+        <p:spPr>
+          <a:xfrm flipV="1">
+            <a:off x="5623856" y="1870204"/>
+            <a:ext cx="1576913" cy="418700"/>
+          </a:xfrm>
+          <a:prstGeom prst="bentUpArrow">
+            <a:avLst/>
+          </a:prstGeom>
+        </p:spPr>
+        <p:style>
+          <a:lnRef idx="1">
+            <a:schemeClr val="accent1"/>
+          </a:lnRef>
+          <a:fillRef idx="3">
+            <a:schemeClr val="accent1"/>
+          </a:fillRef>
+          <a:effectRef idx="2">
+            <a:schemeClr val="accent1"/>
+          </a:effectRef>
+          <a:fontRef idx="minor">
+            <a:schemeClr val="lt1"/>
+          </a:fontRef>
+        </p:style>
+        <p:txBody>
+          <a:bodyPr rtlCol="0" anchor="ctr"/>
+          <a:lstStyle/>
+          <a:p>
+            <a:pPr algn="ctr"/>
+            <a:endParaRPr lang="en-US"/>
+          </a:p>
+        </p:txBody>
+      </p:sp>
+      <p:cxnSp>
+        <p:nvCxnSpPr>
+          <p:cNvPr id="27" name="Straight Arrow Connector 26"/>
+          <p:cNvCxnSpPr/>
+          <p:nvPr/>
+        </p:nvCxnSpPr>
+        <p:spPr>
+          <a:xfrm flipH="1">
+            <a:off x="6726300" y="1417638"/>
+            <a:ext cx="655884" cy="452566"/>
+          </a:xfrm>
+          <a:prstGeom prst="straightConnector1">
+            <a:avLst/>
+          </a:prstGeom>
+          <a:ln>
+            <a:tailEnd type="arrow"/>
+          </a:ln>
+        </p:spPr>
+        <p:style>
+          <a:lnRef idx="2">
+            <a:schemeClr val="accent1"/>
+          </a:lnRef>
+          <a:fillRef idx="0">
+            <a:schemeClr val="accent1"/>
+          </a:fillRef>
+          <a:effectRef idx="1">
+            <a:schemeClr val="accent1"/>
+          </a:effectRef>
+          <a:fontRef idx="minor">
+            <a:schemeClr val="tx1"/>
+          </a:fontRef>
+        </p:style>
+      </p:cxnSp>
+      <p:sp>
+        <p:nvSpPr>
+          <p:cNvPr id="28" name="Snip Single Corner Rectangle 27"/>
+          <p:cNvSpPr/>
+          <p:nvPr/>
+        </p:nvSpPr>
+        <p:spPr>
+          <a:xfrm>
+            <a:off x="6433245" y="1032803"/>
+            <a:ext cx="1814148" cy="362875"/>
+          </a:xfrm>
+          <a:prstGeom prst="snip1Rect">
+            <a:avLst/>
+          </a:prstGeom>
+        </p:spPr>
+        <p:style>
+          <a:lnRef idx="1">
+            <a:schemeClr val="accent1"/>
+          </a:lnRef>
+          <a:fillRef idx="3">
+            <a:schemeClr val="accent1"/>
+          </a:fillRef>
+          <a:effectRef idx="2">
+            <a:schemeClr val="accent1"/>
+          </a:effectRef>
+          <a:fontRef idx="minor">
+            <a:schemeClr val="lt1"/>
+          </a:fontRef>
+        </p:style>
+        <p:txBody>
+          <a:bodyPr rtlCol="0" anchor="ctr"/>
+          <a:lstStyle/>
+          <a:p>
+            <a:pPr algn="ctr"/>
+            <a:r>
+              <a:rPr lang="en-US" dirty="0" smtClean="0"/>
+              <a:t>Server-to-Client </a:t>
+            </a:r>
+            <a:endParaRPr lang="en-US" dirty="0"/>
+          </a:p>
+        </p:txBody>
+      </p:sp>
+      <p:sp>
+        <p:nvSpPr>
+          <p:cNvPr id="29" name="Up-Down Arrow 28"/>
+          <p:cNvSpPr/>
+          <p:nvPr/>
+        </p:nvSpPr>
+        <p:spPr>
+          <a:xfrm>
+            <a:off x="7814788" y="4020661"/>
+            <a:ext cx="432605" cy="961902"/>
+          </a:xfrm>
+          <a:prstGeom prst="upDownArrow">
+            <a:avLst/>
+          </a:prstGeom>
+        </p:spPr>
+        <p:style>
+          <a:lnRef idx="1">
+            <a:schemeClr val="accent1"/>
+          </a:lnRef>
+          <a:fillRef idx="3">
+            <a:schemeClr val="accent1"/>
+          </a:fillRef>
+          <a:effectRef idx="2">
+            <a:schemeClr val="accent1"/>
+          </a:effectRef>
+          <a:fontRef idx="minor">
+            <a:schemeClr val="lt1"/>
+          </a:fontRef>
+        </p:style>
+        <p:txBody>
+          <a:bodyPr rtlCol="0" anchor="ctr"/>
+          <a:lstStyle/>
+          <a:p>
+            <a:pPr algn="ctr"/>
+            <a:endParaRPr lang="en-US"/>
+          </a:p>
+        </p:txBody>
+      </p:sp>
+    </p:spTree>
+    <p:extLst>
+      <p:ext uri="{BB962C8B-B14F-4D97-AF65-F5344CB8AC3E}">
+        <p14:creationId xmlns:p14="http://schemas.microsoft.com/office/powerpoint/2010/main" val="3157454443"/>
       </p:ext>
     </p:extLst>
   </p:cSld>
@@ -4135,4 +6586,324 @@
   </a:objectDefaults>
   <a:extraClrSchemeLst/>
 </a:theme>
+</file>
+
+<file path=ppt/theme/theme2.xml><?xml version="1.0" encoding="utf-8"?>
+<a:theme xmlns:a="http://schemas.openxmlformats.org/drawingml/2006/main" name="Office Theme">
+  <a:themeElements>
+    <a:clrScheme name="Office">
+      <a:dk1>
+        <a:sysClr val="windowText" lastClr="000000"/>
+      </a:dk1>
+      <a:lt1>
+        <a:sysClr val="window" lastClr="FFFFFF"/>
+      </a:lt1>
+      <a:dk2>
+        <a:srgbClr val="1F497D"/>
+      </a:dk2>
+      <a:lt2>
+        <a:srgbClr val="EEECE1"/>
+      </a:lt2>
+      <a:accent1>
+        <a:srgbClr val="4F81BD"/>
+      </a:accent1>
+      <a:accent2>
+        <a:srgbClr val="C0504D"/>
+      </a:accent2>
+      <a:accent3>
+        <a:srgbClr val="9BBB59"/>
+      </a:accent3>
+      <a:accent4>
+        <a:srgbClr val="8064A2"/>
+      </a:accent4>
+      <a:accent5>
+        <a:srgbClr val="4BACC6"/>
+      </a:accent5>
+      <a:accent6>
+        <a:srgbClr val="F79646"/>
+      </a:accent6>
+      <a:hlink>
+        <a:srgbClr val="0000FF"/>
+      </a:hlink>
+      <a:folHlink>
+        <a:srgbClr val="800080"/>
+      </a:folHlink>
+    </a:clrScheme>
+    <a:fontScheme name="Office">
+      <a:majorFont>
+        <a:latin typeface="Calibri"/>
+        <a:ea typeface=""/>
+        <a:cs typeface=""/>
+        <a:font script="Jpan" typeface="ＭＳ Ｐゴシック"/>
+        <a:font script="Hang" typeface="맑은 고딕"/>
+        <a:font script="Hans" typeface="宋体"/>
+        <a:font script="Hant" typeface="新細明體"/>
+        <a:font script="Arab" typeface="Times New Roman"/>
+        <a:font script="Hebr" typeface="Times New Roman"/>
+        <a:font script="Thai" typeface="Angsana New"/>
+        <a:font script="Ethi" typeface="Nyala"/>
+        <a:font script="Beng" typeface="Vrinda"/>
+        <a:font script="Gujr" typeface="Shruti"/>
+        <a:font script="Khmr" typeface="MoolBoran"/>
+        <a:font script="Knda" typeface="Tunga"/>
+        <a:font script="Guru" typeface="Raavi"/>
+        <a:font script="Cans" typeface="Euphemia"/>
+        <a:font script="Cher" typeface="Plantagenet Cherokee"/>
+        <a:font script="Yiii" typeface="Microsoft Yi Baiti"/>
+        <a:font script="Tibt" typeface="Microsoft Himalaya"/>
+        <a:font script="Thaa" typeface="MV Boli"/>
+        <a:font script="Deva" typeface="Mangal"/>
+        <a:font script="Telu" typeface="Gautami"/>
+        <a:font script="Taml" typeface="Latha"/>
+        <a:font script="Syrc" typeface="Estrangelo Edessa"/>
+        <a:font script="Orya" typeface="Kalinga"/>
+        <a:font script="Mlym" typeface="Kartika"/>
+        <a:font script="Laoo" typeface="DokChampa"/>
+        <a:font script="Sinh" typeface="Iskoola Pota"/>
+        <a:font script="Mong" typeface="Mongolian Baiti"/>
+        <a:font script="Viet" typeface="Times New Roman"/>
+        <a:font script="Uigh" typeface="Microsoft Uighur"/>
+        <a:font script="Geor" typeface="Sylfaen"/>
+      </a:majorFont>
+      <a:minorFont>
+        <a:latin typeface="Calibri"/>
+        <a:ea typeface=""/>
+        <a:cs typeface=""/>
+        <a:font script="Jpan" typeface="ＭＳ Ｐゴシック"/>
+        <a:font script="Hang" typeface="맑은 고딕"/>
+        <a:font script="Hans" typeface="宋体"/>
+        <a:font script="Hant" typeface="新細明體"/>
+        <a:font script="Arab" typeface="Arial"/>
+        <a:font script="Hebr" typeface="Arial"/>
+        <a:font script="Thai" typeface="Cordia New"/>
+        <a:font script="Ethi" typeface="Nyala"/>
+        <a:font script="Beng" typeface="Vrinda"/>
+        <a:font script="Gujr" typeface="Shruti"/>
+        <a:font script="Khmr" typeface="DaunPenh"/>
+        <a:font script="Knda" typeface="Tunga"/>
+        <a:font script="Guru" typeface="Raavi"/>
+        <a:font script="Cans" typeface="Euphemia"/>
+        <a:font script="Cher" typeface="Plantagenet Cherokee"/>
+        <a:font script="Yiii" typeface="Microsoft Yi Baiti"/>
+        <a:font script="Tibt" typeface="Microsoft Himalaya"/>
+        <a:font script="Thaa" typeface="MV Boli"/>
+        <a:font script="Deva" typeface="Mangal"/>
+        <a:font script="Telu" typeface="Gautami"/>
+        <a:font script="Taml" typeface="Latha"/>
+        <a:font script="Syrc" typeface="Estrangelo Edessa"/>
+        <a:font script="Orya" typeface="Kalinga"/>
+        <a:font script="Mlym" typeface="Kartika"/>
+        <a:font script="Laoo" typeface="DokChampa"/>
+        <a:font script="Sinh" typeface="Iskoola Pota"/>
+        <a:font script="Mong" typeface="Mongolian Baiti"/>
+        <a:font script="Viet" typeface="Arial"/>
+        <a:font script="Uigh" typeface="Microsoft Uighur"/>
+        <a:font script="Geor" typeface="Sylfaen"/>
+      </a:minorFont>
+    </a:fontScheme>
+    <a:fmtScheme name="Office">
+      <a:fillStyleLst>
+        <a:solidFill>
+          <a:schemeClr val="phClr"/>
+        </a:solidFill>
+        <a:gradFill rotWithShape="1">
+          <a:gsLst>
+            <a:gs pos="0">
+              <a:schemeClr val="phClr">
+                <a:tint val="50000"/>
+                <a:satMod val="300000"/>
+              </a:schemeClr>
+            </a:gs>
+            <a:gs pos="35000">
+              <a:schemeClr val="phClr">
+                <a:tint val="37000"/>
+                <a:satMod val="300000"/>
+              </a:schemeClr>
+            </a:gs>
+            <a:gs pos="100000">
+              <a:schemeClr val="phClr">
+                <a:tint val="15000"/>
+                <a:satMod val="350000"/>
+              </a:schemeClr>
+            </a:gs>
+          </a:gsLst>
+          <a:lin ang="16200000" scaled="1"/>
+        </a:gradFill>
+        <a:gradFill rotWithShape="1">
+          <a:gsLst>
+            <a:gs pos="0">
+              <a:schemeClr val="phClr">
+                <a:tint val="100000"/>
+                <a:shade val="100000"/>
+                <a:satMod val="130000"/>
+              </a:schemeClr>
+            </a:gs>
+            <a:gs pos="100000">
+              <a:schemeClr val="phClr">
+                <a:tint val="50000"/>
+                <a:shade val="100000"/>
+                <a:satMod val="350000"/>
+              </a:schemeClr>
+            </a:gs>
+          </a:gsLst>
+          <a:lin ang="16200000" scaled="0"/>
+        </a:gradFill>
+      </a:fillStyleLst>
+      <a:lnStyleLst>
+        <a:ln w="9525" cap="flat" cmpd="sng" algn="ctr">
+          <a:solidFill>
+            <a:schemeClr val="phClr">
+              <a:shade val="95000"/>
+              <a:satMod val="105000"/>
+            </a:schemeClr>
+          </a:solidFill>
+          <a:prstDash val="solid"/>
+        </a:ln>
+        <a:ln w="25400" cap="flat" cmpd="sng" algn="ctr">
+          <a:solidFill>
+            <a:schemeClr val="phClr"/>
+          </a:solidFill>
+          <a:prstDash val="solid"/>
+        </a:ln>
+        <a:ln w="38100" cap="flat" cmpd="sng" algn="ctr">
+          <a:solidFill>
+            <a:schemeClr val="phClr"/>
+          </a:solidFill>
+          <a:prstDash val="solid"/>
+        </a:ln>
+      </a:lnStyleLst>
+      <a:effectStyleLst>
+        <a:effectStyle>
+          <a:effectLst>
+            <a:outerShdw blurRad="40000" dist="20000" dir="5400000" rotWithShape="0">
+              <a:srgbClr val="000000">
+                <a:alpha val="38000"/>
+              </a:srgbClr>
+            </a:outerShdw>
+          </a:effectLst>
+        </a:effectStyle>
+        <a:effectStyle>
+          <a:effectLst>
+            <a:outerShdw blurRad="40000" dist="23000" dir="5400000" rotWithShape="0">
+              <a:srgbClr val="000000">
+                <a:alpha val="35000"/>
+              </a:srgbClr>
+            </a:outerShdw>
+          </a:effectLst>
+        </a:effectStyle>
+        <a:effectStyle>
+          <a:effectLst>
+            <a:outerShdw blurRad="40000" dist="23000" dir="5400000" rotWithShape="0">
+              <a:srgbClr val="000000">
+                <a:alpha val="35000"/>
+              </a:srgbClr>
+            </a:outerShdw>
+          </a:effectLst>
+          <a:scene3d>
+            <a:camera prst="orthographicFront">
+              <a:rot lat="0" lon="0" rev="0"/>
+            </a:camera>
+            <a:lightRig rig="threePt" dir="t">
+              <a:rot lat="0" lon="0" rev="1200000"/>
+            </a:lightRig>
+          </a:scene3d>
+          <a:sp3d>
+            <a:bevelT w="63500" h="25400"/>
+          </a:sp3d>
+        </a:effectStyle>
+      </a:effectStyleLst>
+      <a:bgFillStyleLst>
+        <a:solidFill>
+          <a:schemeClr val="phClr"/>
+        </a:solidFill>
+        <a:gradFill rotWithShape="1">
+          <a:gsLst>
+            <a:gs pos="0">
+              <a:schemeClr val="phClr">
+                <a:tint val="40000"/>
+                <a:satMod val="350000"/>
+              </a:schemeClr>
+            </a:gs>
+            <a:gs pos="40000">
+              <a:schemeClr val="phClr">
+                <a:tint val="45000"/>
+                <a:shade val="99000"/>
+                <a:satMod val="350000"/>
+              </a:schemeClr>
+            </a:gs>
+            <a:gs pos="100000">
+              <a:schemeClr val="phClr">
+                <a:shade val="20000"/>
+                <a:satMod val="255000"/>
+              </a:schemeClr>
+            </a:gs>
+          </a:gsLst>
+          <a:path path="circle">
+            <a:fillToRect l="50000" t="-80000" r="50000" b="180000"/>
+          </a:path>
+        </a:gradFill>
+        <a:gradFill rotWithShape="1">
+          <a:gsLst>
+            <a:gs pos="0">
+              <a:schemeClr val="phClr">
+                <a:tint val="80000"/>
+                <a:satMod val="300000"/>
+              </a:schemeClr>
+            </a:gs>
+            <a:gs pos="100000">
+              <a:schemeClr val="phClr">
+                <a:shade val="30000"/>
+                <a:satMod val="200000"/>
+              </a:schemeClr>
+            </a:gs>
+          </a:gsLst>
+          <a:path path="circle">
+            <a:fillToRect l="50000" t="50000" r="50000" b="50000"/>
+          </a:path>
+        </a:gradFill>
+      </a:bgFillStyleLst>
+    </a:fmtScheme>
+  </a:themeElements>
+  <a:objectDefaults>
+    <a:spDef>
+      <a:spPr/>
+      <a:bodyPr/>
+      <a:lstStyle/>
+      <a:style>
+        <a:lnRef idx="1">
+          <a:schemeClr val="accent1"/>
+        </a:lnRef>
+        <a:fillRef idx="3">
+          <a:schemeClr val="accent1"/>
+        </a:fillRef>
+        <a:effectRef idx="2">
+          <a:schemeClr val="accent1"/>
+        </a:effectRef>
+        <a:fontRef idx="minor">
+          <a:schemeClr val="lt1"/>
+        </a:fontRef>
+      </a:style>
+    </a:spDef>
+    <a:lnDef>
+      <a:spPr/>
+      <a:bodyPr/>
+      <a:lstStyle/>
+      <a:style>
+        <a:lnRef idx="2">
+          <a:schemeClr val="accent1"/>
+        </a:lnRef>
+        <a:fillRef idx="0">
+          <a:schemeClr val="accent1"/>
+        </a:fillRef>
+        <a:effectRef idx="1">
+          <a:schemeClr val="accent1"/>
+        </a:effectRef>
+        <a:fontRef idx="minor">
+          <a:schemeClr val="tx1"/>
+        </a:fontRef>
+      </a:style>
+    </a:lnDef>
+  </a:objectDefaults>
+  <a:extraClrSchemeLst/>
+</a:theme>
 </file>
</xml_diff>